<commit_message>
Modifications to ppt and image for screen
</commit_message>
<xml_diff>
--- a/Blender Project Team Rocket.pptx
+++ b/Blender Project Team Rocket.pptx
@@ -11,15 +11,19 @@
     <p:sldId id="257" r:id="rId5"/>
     <p:sldId id="258" r:id="rId6"/>
     <p:sldId id="270" r:id="rId7"/>
-    <p:sldId id="259" r:id="rId8"/>
-    <p:sldId id="262" r:id="rId9"/>
-    <p:sldId id="263" r:id="rId10"/>
-    <p:sldId id="264" r:id="rId11"/>
-    <p:sldId id="265" r:id="rId12"/>
-    <p:sldId id="266" r:id="rId13"/>
-    <p:sldId id="267" r:id="rId14"/>
-    <p:sldId id="268" r:id="rId15"/>
-    <p:sldId id="269" r:id="rId16"/>
+    <p:sldId id="273" r:id="rId8"/>
+    <p:sldId id="271" r:id="rId9"/>
+    <p:sldId id="274" r:id="rId10"/>
+    <p:sldId id="259" r:id="rId11"/>
+    <p:sldId id="262" r:id="rId12"/>
+    <p:sldId id="263" r:id="rId13"/>
+    <p:sldId id="264" r:id="rId14"/>
+    <p:sldId id="265" r:id="rId15"/>
+    <p:sldId id="266" r:id="rId16"/>
+    <p:sldId id="267" r:id="rId17"/>
+    <p:sldId id="268" r:id="rId18"/>
+    <p:sldId id="269" r:id="rId19"/>
+    <p:sldId id="272" r:id="rId20"/>
   </p:sldIdLst>
   <p:sldSz cx="12192000" cy="6858000"/>
   <p:notesSz cx="6858000" cy="9144000"/>
@@ -723,7 +727,7 @@
         </p:nvSpPr>
         <p:spPr>
           <a:xfrm>
-            <a:off x="1507067" y="4050833"/>
+            <a:off x="1507067" y="4050835"/>
             <a:ext cx="7766936" cy="1096899"/>
           </a:xfrm>
         </p:spPr>
@@ -741,7 +745,7 @@
                 </a:solidFill>
               </a:defRPr>
             </a:lvl1pPr>
-            <a:lvl2pPr marL="457200" indent="0" algn="ctr">
+            <a:lvl2pPr marL="457189" indent="0" algn="ctr">
               <a:buNone/>
               <a:defRPr>
                 <a:solidFill>
@@ -751,7 +755,7 @@
                 </a:solidFill>
               </a:defRPr>
             </a:lvl2pPr>
-            <a:lvl3pPr marL="914400" indent="0" algn="ctr">
+            <a:lvl3pPr marL="914377" indent="0" algn="ctr">
               <a:buNone/>
               <a:defRPr>
                 <a:solidFill>
@@ -761,7 +765,7 @@
                 </a:solidFill>
               </a:defRPr>
             </a:lvl3pPr>
-            <a:lvl4pPr marL="1371600" indent="0" algn="ctr">
+            <a:lvl4pPr marL="1371566" indent="0" algn="ctr">
               <a:buNone/>
               <a:defRPr>
                 <a:solidFill>
@@ -771,7 +775,7 @@
                 </a:solidFill>
               </a:defRPr>
             </a:lvl4pPr>
-            <a:lvl5pPr marL="1828800" indent="0" algn="ctr">
+            <a:lvl5pPr marL="1828754" indent="0" algn="ctr">
               <a:buNone/>
               <a:defRPr>
                 <a:solidFill>
@@ -781,7 +785,7 @@
                 </a:solidFill>
               </a:defRPr>
             </a:lvl5pPr>
-            <a:lvl6pPr marL="2286000" indent="0" algn="ctr">
+            <a:lvl6pPr marL="2285943" indent="0" algn="ctr">
               <a:buNone/>
               <a:defRPr>
                 <a:solidFill>
@@ -791,7 +795,7 @@
                 </a:solidFill>
               </a:defRPr>
             </a:lvl6pPr>
-            <a:lvl7pPr marL="2743200" indent="0" algn="ctr">
+            <a:lvl7pPr marL="2743131" indent="0" algn="ctr">
               <a:buNone/>
               <a:defRPr>
                 <a:solidFill>
@@ -801,7 +805,7 @@
                 </a:solidFill>
               </a:defRPr>
             </a:lvl7pPr>
-            <a:lvl8pPr marL="3200400" indent="0" algn="ctr">
+            <a:lvl8pPr marL="3200320" indent="0" algn="ctr">
               <a:buNone/>
               <a:defRPr>
                 <a:solidFill>
@@ -811,7 +815,7 @@
                 </a:solidFill>
               </a:defRPr>
             </a:lvl8pPr>
-            <a:lvl9pPr marL="3657600" indent="0" algn="ctr">
+            <a:lvl9pPr marL="3657509" indent="0" algn="ctr">
               <a:buNone/>
               <a:defRPr>
                 <a:solidFill>
@@ -906,7 +910,7 @@
   <p:clrMapOvr>
     <a:masterClrMapping/>
   </p:clrMapOvr>
-  <p:extLst>
+  <p:extLst mod="1">
     <p:ext uri="{DCECCB84-F9BA-43D5-87BE-67443E8EF086}">
       <p15:sldGuideLst xmlns:p15="http://schemas.microsoft.com/office/powerpoint/2012/main"/>
     </p:ext>
@@ -997,7 +1001,7 @@
                 </a:solidFill>
               </a:defRPr>
             </a:lvl1pPr>
-            <a:lvl2pPr marL="457200" indent="0">
+            <a:lvl2pPr marL="457189" indent="0">
               <a:buNone/>
               <a:defRPr sz="1800">
                 <a:solidFill>
@@ -1007,7 +1011,7 @@
                 </a:solidFill>
               </a:defRPr>
             </a:lvl2pPr>
-            <a:lvl3pPr marL="914400" indent="0">
+            <a:lvl3pPr marL="914377" indent="0">
               <a:buNone/>
               <a:defRPr sz="1600">
                 <a:solidFill>
@@ -1017,7 +1021,7 @@
                 </a:solidFill>
               </a:defRPr>
             </a:lvl3pPr>
-            <a:lvl4pPr marL="1371600" indent="0">
+            <a:lvl4pPr marL="1371566" indent="0">
               <a:buNone/>
               <a:defRPr sz="1400">
                 <a:solidFill>
@@ -1027,7 +1031,7 @@
                 </a:solidFill>
               </a:defRPr>
             </a:lvl4pPr>
-            <a:lvl5pPr marL="1828800" indent="0">
+            <a:lvl5pPr marL="1828754" indent="0">
               <a:buNone/>
               <a:defRPr sz="1400">
                 <a:solidFill>
@@ -1037,7 +1041,7 @@
                 </a:solidFill>
               </a:defRPr>
             </a:lvl5pPr>
-            <a:lvl6pPr marL="2286000" indent="0">
+            <a:lvl6pPr marL="2285943" indent="0">
               <a:buNone/>
               <a:defRPr sz="1400">
                 <a:solidFill>
@@ -1047,7 +1051,7 @@
                 </a:solidFill>
               </a:defRPr>
             </a:lvl6pPr>
-            <a:lvl7pPr marL="2743200" indent="0">
+            <a:lvl7pPr marL="2743131" indent="0">
               <a:buNone/>
               <a:defRPr sz="1400">
                 <a:solidFill>
@@ -1057,7 +1061,7 @@
                 </a:solidFill>
               </a:defRPr>
             </a:lvl7pPr>
-            <a:lvl8pPr marL="3200400" indent="0">
+            <a:lvl8pPr marL="3200320" indent="0">
               <a:buNone/>
               <a:defRPr sz="1400">
                 <a:solidFill>
@@ -1067,7 +1071,7 @@
                 </a:solidFill>
               </a:defRPr>
             </a:lvl8pPr>
-            <a:lvl9pPr marL="3657600" indent="0">
+            <a:lvl9pPr marL="3657509" indent="0">
               <a:buNone/>
               <a:defRPr sz="1400">
                 <a:solidFill>
@@ -1195,7 +1199,7 @@
         <p:spPr>
           <a:xfrm>
             <a:off x="931334" y="609600"/>
-            <a:ext cx="8094134" cy="3022600"/>
+            <a:ext cx="8094135" cy="3022600"/>
           </a:xfrm>
         </p:spPr>
         <p:txBody>
@@ -1249,22 +1253,22 @@
                 </a:solidFill>
               </a:defRPr>
             </a:lvl1pPr>
-            <a:lvl2pPr marL="457200" indent="0">
+            <a:lvl2pPr marL="457189" indent="0">
               <a:buFontTx/>
               <a:buNone/>
               <a:defRPr/>
             </a:lvl2pPr>
-            <a:lvl3pPr marL="914400" indent="0">
+            <a:lvl3pPr marL="914377" indent="0">
               <a:buFontTx/>
               <a:buNone/>
               <a:defRPr/>
             </a:lvl3pPr>
-            <a:lvl4pPr marL="1371600" indent="0">
+            <a:lvl4pPr marL="1371566" indent="0">
               <a:buFontTx/>
               <a:buNone/>
               <a:defRPr/>
             </a:lvl4pPr>
-            <a:lvl5pPr marL="1828800" indent="0">
+            <a:lvl5pPr marL="1828754" indent="0">
               <a:buFontTx/>
               <a:buNone/>
               <a:defRPr/>
@@ -1311,7 +1315,7 @@
                 </a:solidFill>
               </a:defRPr>
             </a:lvl1pPr>
-            <a:lvl2pPr marL="457200" indent="0">
+            <a:lvl2pPr marL="457189" indent="0">
               <a:buNone/>
               <a:defRPr sz="1800">
                 <a:solidFill>
@@ -1321,7 +1325,7 @@
                 </a:solidFill>
               </a:defRPr>
             </a:lvl2pPr>
-            <a:lvl3pPr marL="914400" indent="0">
+            <a:lvl3pPr marL="914377" indent="0">
               <a:buNone/>
               <a:defRPr sz="1600">
                 <a:solidFill>
@@ -1331,7 +1335,7 @@
                 </a:solidFill>
               </a:defRPr>
             </a:lvl3pPr>
-            <a:lvl4pPr marL="1371600" indent="0">
+            <a:lvl4pPr marL="1371566" indent="0">
               <a:buNone/>
               <a:defRPr sz="1400">
                 <a:solidFill>
@@ -1341,7 +1345,7 @@
                 </a:solidFill>
               </a:defRPr>
             </a:lvl4pPr>
-            <a:lvl5pPr marL="1828800" indent="0">
+            <a:lvl5pPr marL="1828754" indent="0">
               <a:buNone/>
               <a:defRPr sz="1400">
                 <a:solidFill>
@@ -1351,7 +1355,7 @@
                 </a:solidFill>
               </a:defRPr>
             </a:lvl5pPr>
-            <a:lvl6pPr marL="2286000" indent="0">
+            <a:lvl6pPr marL="2285943" indent="0">
               <a:buNone/>
               <a:defRPr sz="1400">
                 <a:solidFill>
@@ -1361,7 +1365,7 @@
                 </a:solidFill>
               </a:defRPr>
             </a:lvl6pPr>
-            <a:lvl7pPr marL="2743200" indent="0">
+            <a:lvl7pPr marL="2743131" indent="0">
               <a:buNone/>
               <a:defRPr sz="1400">
                 <a:solidFill>
@@ -1371,7 +1375,7 @@
                 </a:solidFill>
               </a:defRPr>
             </a:lvl7pPr>
-            <a:lvl8pPr marL="3200400" indent="0">
+            <a:lvl8pPr marL="3200320" indent="0">
               <a:buNone/>
               <a:defRPr sz="1400">
                 <a:solidFill>
@@ -1381,7 +1385,7 @@
                 </a:solidFill>
               </a:defRPr>
             </a:lvl8pPr>
-            <a:lvl9pPr marL="3657600" indent="0">
+            <a:lvl9pPr marL="3657509" indent="0">
               <a:buNone/>
               <a:defRPr sz="1400">
                 <a:solidFill>
@@ -1474,7 +1478,7 @@
         </p:nvSpPr>
         <p:spPr>
           <a:xfrm>
-            <a:off x="541870" y="790378"/>
+            <a:off x="541871" y="790378"/>
             <a:ext cx="609600" cy="584776"/>
           </a:xfrm>
           <a:prstGeom prst="rect">
@@ -1544,7 +1548,7 @@
               </a:rPr>
               <a:t>”</a:t>
             </a:r>
-            <a:endParaRPr lang="en-US" dirty="0">
+            <a:endParaRPr lang="en-US" sz="1800" dirty="0">
               <a:solidFill>
                 <a:schemeClr val="accent1">
                   <a:lumMod val="60000"/>
@@ -1652,7 +1656,7 @@
                 </a:solidFill>
               </a:defRPr>
             </a:lvl1pPr>
-            <a:lvl2pPr marL="457200" indent="0">
+            <a:lvl2pPr marL="457189" indent="0">
               <a:buNone/>
               <a:defRPr sz="1800">
                 <a:solidFill>
@@ -1662,7 +1666,7 @@
                 </a:solidFill>
               </a:defRPr>
             </a:lvl2pPr>
-            <a:lvl3pPr marL="914400" indent="0">
+            <a:lvl3pPr marL="914377" indent="0">
               <a:buNone/>
               <a:defRPr sz="1600">
                 <a:solidFill>
@@ -1672,7 +1676,7 @@
                 </a:solidFill>
               </a:defRPr>
             </a:lvl3pPr>
-            <a:lvl4pPr marL="1371600" indent="0">
+            <a:lvl4pPr marL="1371566" indent="0">
               <a:buNone/>
               <a:defRPr sz="1400">
                 <a:solidFill>
@@ -1682,7 +1686,7 @@
                 </a:solidFill>
               </a:defRPr>
             </a:lvl4pPr>
-            <a:lvl5pPr marL="1828800" indent="0">
+            <a:lvl5pPr marL="1828754" indent="0">
               <a:buNone/>
               <a:defRPr sz="1400">
                 <a:solidFill>
@@ -1692,7 +1696,7 @@
                 </a:solidFill>
               </a:defRPr>
             </a:lvl5pPr>
-            <a:lvl6pPr marL="2286000" indent="0">
+            <a:lvl6pPr marL="2285943" indent="0">
               <a:buNone/>
               <a:defRPr sz="1400">
                 <a:solidFill>
@@ -1702,7 +1706,7 @@
                 </a:solidFill>
               </a:defRPr>
             </a:lvl6pPr>
-            <a:lvl7pPr marL="2743200" indent="0">
+            <a:lvl7pPr marL="2743131" indent="0">
               <a:buNone/>
               <a:defRPr sz="1400">
                 <a:solidFill>
@@ -1712,7 +1716,7 @@
                 </a:solidFill>
               </a:defRPr>
             </a:lvl7pPr>
-            <a:lvl8pPr marL="3200400" indent="0">
+            <a:lvl8pPr marL="3200320" indent="0">
               <a:buNone/>
               <a:defRPr sz="1400">
                 <a:solidFill>
@@ -1722,7 +1726,7 @@
                 </a:solidFill>
               </a:defRPr>
             </a:lvl8pPr>
-            <a:lvl9pPr marL="3657600" indent="0">
+            <a:lvl9pPr marL="3657509" indent="0">
               <a:buNone/>
               <a:defRPr sz="1400">
                 <a:solidFill>
@@ -1850,7 +1854,7 @@
         <p:spPr>
           <a:xfrm>
             <a:off x="931334" y="609600"/>
-            <a:ext cx="8094134" cy="3022600"/>
+            <a:ext cx="8094135" cy="3022600"/>
           </a:xfrm>
         </p:spPr>
         <p:txBody>
@@ -1904,22 +1908,22 @@
                 </a:solidFill>
               </a:defRPr>
             </a:lvl1pPr>
-            <a:lvl2pPr marL="457200" indent="0">
+            <a:lvl2pPr marL="457189" indent="0">
               <a:buFontTx/>
               <a:buNone/>
               <a:defRPr/>
             </a:lvl2pPr>
-            <a:lvl3pPr marL="914400" indent="0">
+            <a:lvl3pPr marL="914377" indent="0">
               <a:buFontTx/>
               <a:buNone/>
               <a:defRPr/>
             </a:lvl3pPr>
-            <a:lvl4pPr marL="1371600" indent="0">
+            <a:lvl4pPr marL="1371566" indent="0">
               <a:buFontTx/>
               <a:buNone/>
               <a:defRPr/>
             </a:lvl4pPr>
-            <a:lvl5pPr marL="1828800" indent="0">
+            <a:lvl5pPr marL="1828754" indent="0">
               <a:buFontTx/>
               <a:buNone/>
               <a:defRPr/>
@@ -1966,7 +1970,7 @@
                 </a:solidFill>
               </a:defRPr>
             </a:lvl1pPr>
-            <a:lvl2pPr marL="457200" indent="0">
+            <a:lvl2pPr marL="457189" indent="0">
               <a:buNone/>
               <a:defRPr sz="1800">
                 <a:solidFill>
@@ -1976,7 +1980,7 @@
                 </a:solidFill>
               </a:defRPr>
             </a:lvl2pPr>
-            <a:lvl3pPr marL="914400" indent="0">
+            <a:lvl3pPr marL="914377" indent="0">
               <a:buNone/>
               <a:defRPr sz="1600">
                 <a:solidFill>
@@ -1986,7 +1990,7 @@
                 </a:solidFill>
               </a:defRPr>
             </a:lvl3pPr>
-            <a:lvl4pPr marL="1371600" indent="0">
+            <a:lvl4pPr marL="1371566" indent="0">
               <a:buNone/>
               <a:defRPr sz="1400">
                 <a:solidFill>
@@ -1996,7 +2000,7 @@
                 </a:solidFill>
               </a:defRPr>
             </a:lvl4pPr>
-            <a:lvl5pPr marL="1828800" indent="0">
+            <a:lvl5pPr marL="1828754" indent="0">
               <a:buNone/>
               <a:defRPr sz="1400">
                 <a:solidFill>
@@ -2006,7 +2010,7 @@
                 </a:solidFill>
               </a:defRPr>
             </a:lvl5pPr>
-            <a:lvl6pPr marL="2286000" indent="0">
+            <a:lvl6pPr marL="2285943" indent="0">
               <a:buNone/>
               <a:defRPr sz="1400">
                 <a:solidFill>
@@ -2016,7 +2020,7 @@
                 </a:solidFill>
               </a:defRPr>
             </a:lvl6pPr>
-            <a:lvl7pPr marL="2743200" indent="0">
+            <a:lvl7pPr marL="2743131" indent="0">
               <a:buNone/>
               <a:defRPr sz="1400">
                 <a:solidFill>
@@ -2026,7 +2030,7 @@
                 </a:solidFill>
               </a:defRPr>
             </a:lvl7pPr>
-            <a:lvl8pPr marL="3200400" indent="0">
+            <a:lvl8pPr marL="3200320" indent="0">
               <a:buNone/>
               <a:defRPr sz="1400">
                 <a:solidFill>
@@ -2036,7 +2040,7 @@
                 </a:solidFill>
               </a:defRPr>
             </a:lvl8pPr>
-            <a:lvl9pPr marL="3657600" indent="0">
+            <a:lvl9pPr marL="3657509" indent="0">
               <a:buNone/>
               <a:defRPr sz="1400">
                 <a:solidFill>
@@ -2129,7 +2133,7 @@
         </p:nvSpPr>
         <p:spPr>
           <a:xfrm>
-            <a:off x="541870" y="790378"/>
+            <a:off x="541871" y="790378"/>
             <a:ext cx="609600" cy="584776"/>
           </a:xfrm>
           <a:prstGeom prst="rect">
@@ -2245,7 +2249,7 @@
         </p:nvSpPr>
         <p:spPr>
           <a:xfrm>
-            <a:off x="685799" y="609600"/>
+            <a:off x="685800" y="609600"/>
             <a:ext cx="8588203" cy="3022600"/>
           </a:xfrm>
         </p:spPr>
@@ -2297,22 +2301,22 @@
                 </a:solidFill>
               </a:defRPr>
             </a:lvl1pPr>
-            <a:lvl2pPr marL="457200" indent="0">
+            <a:lvl2pPr marL="457189" indent="0">
               <a:buFontTx/>
               <a:buNone/>
               <a:defRPr/>
             </a:lvl2pPr>
-            <a:lvl3pPr marL="914400" indent="0">
+            <a:lvl3pPr marL="914377" indent="0">
               <a:buFontTx/>
               <a:buNone/>
               <a:defRPr/>
             </a:lvl3pPr>
-            <a:lvl4pPr marL="1371600" indent="0">
+            <a:lvl4pPr marL="1371566" indent="0">
               <a:buFontTx/>
               <a:buNone/>
               <a:defRPr/>
             </a:lvl4pPr>
-            <a:lvl5pPr marL="1828800" indent="0">
+            <a:lvl5pPr marL="1828754" indent="0">
               <a:buFontTx/>
               <a:buNone/>
               <a:defRPr/>
@@ -2359,7 +2363,7 @@
                 </a:solidFill>
               </a:defRPr>
             </a:lvl1pPr>
-            <a:lvl2pPr marL="457200" indent="0">
+            <a:lvl2pPr marL="457189" indent="0">
               <a:buNone/>
               <a:defRPr sz="1800">
                 <a:solidFill>
@@ -2369,7 +2373,7 @@
                 </a:solidFill>
               </a:defRPr>
             </a:lvl2pPr>
-            <a:lvl3pPr marL="914400" indent="0">
+            <a:lvl3pPr marL="914377" indent="0">
               <a:buNone/>
               <a:defRPr sz="1600">
                 <a:solidFill>
@@ -2379,7 +2383,7 @@
                 </a:solidFill>
               </a:defRPr>
             </a:lvl3pPr>
-            <a:lvl4pPr marL="1371600" indent="0">
+            <a:lvl4pPr marL="1371566" indent="0">
               <a:buNone/>
               <a:defRPr sz="1400">
                 <a:solidFill>
@@ -2389,7 +2393,7 @@
                 </a:solidFill>
               </a:defRPr>
             </a:lvl4pPr>
-            <a:lvl5pPr marL="1828800" indent="0">
+            <a:lvl5pPr marL="1828754" indent="0">
               <a:buNone/>
               <a:defRPr sz="1400">
                 <a:solidFill>
@@ -2399,7 +2403,7 @@
                 </a:solidFill>
               </a:defRPr>
             </a:lvl5pPr>
-            <a:lvl6pPr marL="2286000" indent="0">
+            <a:lvl6pPr marL="2285943" indent="0">
               <a:buNone/>
               <a:defRPr sz="1400">
                 <a:solidFill>
@@ -2409,7 +2413,7 @@
                 </a:solidFill>
               </a:defRPr>
             </a:lvl6pPr>
-            <a:lvl7pPr marL="2743200" indent="0">
+            <a:lvl7pPr marL="2743131" indent="0">
               <a:buNone/>
               <a:defRPr sz="1400">
                 <a:solidFill>
@@ -2419,7 +2423,7 @@
                 </a:solidFill>
               </a:defRPr>
             </a:lvl7pPr>
-            <a:lvl8pPr marL="3200400" indent="0">
+            <a:lvl8pPr marL="3200320" indent="0">
               <a:buNone/>
               <a:defRPr sz="1400">
                 <a:solidFill>
@@ -2429,7 +2433,7 @@
                 </a:solidFill>
               </a:defRPr>
             </a:lvl8pPr>
-            <a:lvl9pPr marL="3657600" indent="0">
+            <a:lvl9pPr marL="3657509" indent="0">
               <a:buNone/>
               <a:defRPr sz="1400">
                 <a:solidFill>
@@ -2726,7 +2730,7 @@
         </p:nvSpPr>
         <p:spPr>
           <a:xfrm>
-            <a:off x="7967673" y="609599"/>
+            <a:off x="7967674" y="609601"/>
             <a:ext cx="1304743" cy="5251451"/>
           </a:xfrm>
         </p:spPr>
@@ -2755,7 +2759,7 @@
         <p:spPr>
           <a:xfrm>
             <a:off x="677335" y="609600"/>
-            <a:ext cx="7060150" cy="5251450"/>
+            <a:ext cx="7060151" cy="5251450"/>
           </a:xfrm>
         </p:spPr>
         <p:txBody>
@@ -2874,7 +2878,7 @@
   <p:clrMapOvr>
     <a:masterClrMapping/>
   </p:clrMapOvr>
-  <p:extLst>
+  <p:extLst mod="1">
     <p:ext uri="{DCECCB84-F9BA-43D5-87BE-67443E8EF086}">
       <p15:sldGuideLst xmlns:p15="http://schemas.microsoft.com/office/powerpoint/2012/main"/>
     </p:ext>
@@ -3087,7 +3091,7 @@
         </p:nvSpPr>
         <p:spPr>
           <a:xfrm>
-            <a:off x="677335" y="2700867"/>
+            <a:off x="677335" y="2700869"/>
             <a:ext cx="8596668" cy="1826581"/>
           </a:xfrm>
         </p:spPr>
@@ -3137,7 +3141,7 @@
                 </a:solidFill>
               </a:defRPr>
             </a:lvl1pPr>
-            <a:lvl2pPr marL="457200" indent="0">
+            <a:lvl2pPr marL="457189" indent="0">
               <a:buNone/>
               <a:defRPr sz="1800">
                 <a:solidFill>
@@ -3147,7 +3151,7 @@
                 </a:solidFill>
               </a:defRPr>
             </a:lvl2pPr>
-            <a:lvl3pPr marL="914400" indent="0">
+            <a:lvl3pPr marL="914377" indent="0">
               <a:buNone/>
               <a:defRPr sz="1600">
                 <a:solidFill>
@@ -3157,7 +3161,7 @@
                 </a:solidFill>
               </a:defRPr>
             </a:lvl3pPr>
-            <a:lvl4pPr marL="1371600" indent="0">
+            <a:lvl4pPr marL="1371566" indent="0">
               <a:buNone/>
               <a:defRPr sz="1400">
                 <a:solidFill>
@@ -3167,7 +3171,7 @@
                 </a:solidFill>
               </a:defRPr>
             </a:lvl4pPr>
-            <a:lvl5pPr marL="1828800" indent="0">
+            <a:lvl5pPr marL="1828754" indent="0">
               <a:buNone/>
               <a:defRPr sz="1400">
                 <a:solidFill>
@@ -3177,7 +3181,7 @@
                 </a:solidFill>
               </a:defRPr>
             </a:lvl5pPr>
-            <a:lvl6pPr marL="2286000" indent="0">
+            <a:lvl6pPr marL="2285943" indent="0">
               <a:buNone/>
               <a:defRPr sz="1400">
                 <a:solidFill>
@@ -3187,7 +3191,7 @@
                 </a:solidFill>
               </a:defRPr>
             </a:lvl6pPr>
-            <a:lvl7pPr marL="2743200" indent="0">
+            <a:lvl7pPr marL="2743131" indent="0">
               <a:buNone/>
               <a:defRPr sz="1400">
                 <a:solidFill>
@@ -3197,7 +3201,7 @@
                 </a:solidFill>
               </a:defRPr>
             </a:lvl7pPr>
-            <a:lvl8pPr marL="3200400" indent="0">
+            <a:lvl8pPr marL="3200320" indent="0">
               <a:buNone/>
               <a:defRPr sz="1400">
                 <a:solidFill>
@@ -3207,7 +3211,7 @@
                 </a:solidFill>
               </a:defRPr>
             </a:lvl8pPr>
-            <a:lvl9pPr marL="3657600" indent="0">
+            <a:lvl9pPr marL="3657509" indent="0">
               <a:buNone/>
               <a:defRPr sz="1400">
                 <a:solidFill>
@@ -3302,7 +3306,7 @@
   <p:clrMapOvr>
     <a:masterClrMapping/>
   </p:clrMapOvr>
-  <p:extLst>
+  <p:extLst mod="1">
     <p:ext uri="{DCECCB84-F9BA-43D5-87BE-67443E8EF086}">
       <p15:sldGuideLst xmlns:p15="http://schemas.microsoft.com/office/powerpoint/2012/main"/>
     </p:ext>
@@ -3362,7 +3366,7 @@
         </p:nvSpPr>
         <p:spPr>
           <a:xfrm>
-            <a:off x="677334" y="2160589"/>
+            <a:off x="677335" y="2160589"/>
             <a:ext cx="4184035" cy="3880772"/>
           </a:xfrm>
         </p:spPr>
@@ -3419,8 +3423,8 @@
         </p:nvSpPr>
         <p:spPr>
           <a:xfrm>
-            <a:off x="5089970" y="2160589"/>
-            <a:ext cx="4184034" cy="3880773"/>
+            <a:off x="5089969" y="2160590"/>
+            <a:ext cx="4184035" cy="3880773"/>
           </a:xfrm>
         </p:spPr>
         <p:txBody>
@@ -3539,7 +3543,7 @@
   <p:clrMapOvr>
     <a:masterClrMapping/>
   </p:clrMapOvr>
-  <p:extLst>
+  <p:extLst mod="1">
     <p:ext uri="{DCECCB84-F9BA-43D5-87BE-67443E8EF086}">
       <p15:sldGuideLst xmlns:p15="http://schemas.microsoft.com/office/powerpoint/2012/main"/>
     </p:ext>
@@ -3603,7 +3607,7 @@
         </p:nvSpPr>
         <p:spPr>
           <a:xfrm>
-            <a:off x="675745" y="2160983"/>
+            <a:off x="675746" y="2160983"/>
             <a:ext cx="4185623" cy="576262"/>
           </a:xfrm>
         </p:spPr>
@@ -3616,35 +3620,35 @@
               <a:buNone/>
               <a:defRPr sz="2400" b="0"/>
             </a:lvl1pPr>
-            <a:lvl2pPr marL="457200" indent="0">
+            <a:lvl2pPr marL="457189" indent="0">
               <a:buNone/>
               <a:defRPr sz="2000" b="1"/>
             </a:lvl2pPr>
-            <a:lvl3pPr marL="914400" indent="0">
+            <a:lvl3pPr marL="914377" indent="0">
               <a:buNone/>
               <a:defRPr sz="1800" b="1"/>
             </a:lvl3pPr>
-            <a:lvl4pPr marL="1371600" indent="0">
+            <a:lvl4pPr marL="1371566" indent="0">
               <a:buNone/>
               <a:defRPr sz="1600" b="1"/>
             </a:lvl4pPr>
-            <a:lvl5pPr marL="1828800" indent="0">
+            <a:lvl5pPr marL="1828754" indent="0">
               <a:buNone/>
               <a:defRPr sz="1600" b="1"/>
             </a:lvl5pPr>
-            <a:lvl6pPr marL="2286000" indent="0">
+            <a:lvl6pPr marL="2285943" indent="0">
               <a:buNone/>
               <a:defRPr sz="1600" b="1"/>
             </a:lvl6pPr>
-            <a:lvl7pPr marL="2743200" indent="0">
+            <a:lvl7pPr marL="2743131" indent="0">
               <a:buNone/>
               <a:defRPr sz="1600" b="1"/>
             </a:lvl7pPr>
-            <a:lvl8pPr marL="3200400" indent="0">
+            <a:lvl8pPr marL="3200320" indent="0">
               <a:buNone/>
               <a:defRPr sz="1600" b="1"/>
             </a:lvl8pPr>
-            <a:lvl9pPr marL="3657600" indent="0">
+            <a:lvl9pPr marL="3657509" indent="0">
               <a:buNone/>
               <a:defRPr sz="1600" b="1"/>
             </a:lvl9pPr>
@@ -3670,7 +3674,7 @@
         </p:nvSpPr>
         <p:spPr>
           <a:xfrm>
-            <a:off x="675745" y="2737245"/>
+            <a:off x="675746" y="2737247"/>
             <a:ext cx="4185623" cy="3304117"/>
           </a:xfrm>
         </p:spPr>
@@ -3730,7 +3734,7 @@
         <p:spPr>
           <a:xfrm>
             <a:off x="5088383" y="2160983"/>
-            <a:ext cx="4185618" cy="576262"/>
+            <a:ext cx="4185619" cy="576262"/>
           </a:xfrm>
         </p:spPr>
         <p:txBody>
@@ -3742,35 +3746,35 @@
               <a:buNone/>
               <a:defRPr sz="2400" b="0"/>
             </a:lvl1pPr>
-            <a:lvl2pPr marL="457200" indent="0">
+            <a:lvl2pPr marL="457189" indent="0">
               <a:buNone/>
               <a:defRPr sz="2000" b="1"/>
             </a:lvl2pPr>
-            <a:lvl3pPr marL="914400" indent="0">
+            <a:lvl3pPr marL="914377" indent="0">
               <a:buNone/>
               <a:defRPr sz="1800" b="1"/>
             </a:lvl3pPr>
-            <a:lvl4pPr marL="1371600" indent="0">
+            <a:lvl4pPr marL="1371566" indent="0">
               <a:buNone/>
               <a:defRPr sz="1600" b="1"/>
             </a:lvl4pPr>
-            <a:lvl5pPr marL="1828800" indent="0">
+            <a:lvl5pPr marL="1828754" indent="0">
               <a:buNone/>
               <a:defRPr sz="1600" b="1"/>
             </a:lvl5pPr>
-            <a:lvl6pPr marL="2286000" indent="0">
+            <a:lvl6pPr marL="2285943" indent="0">
               <a:buNone/>
               <a:defRPr sz="1600" b="1"/>
             </a:lvl6pPr>
-            <a:lvl7pPr marL="2743200" indent="0">
+            <a:lvl7pPr marL="2743131" indent="0">
               <a:buNone/>
               <a:defRPr sz="1600" b="1"/>
             </a:lvl7pPr>
-            <a:lvl8pPr marL="3200400" indent="0">
+            <a:lvl8pPr marL="3200320" indent="0">
               <a:buNone/>
               <a:defRPr sz="1600" b="1"/>
             </a:lvl8pPr>
-            <a:lvl9pPr marL="3657600" indent="0">
+            <a:lvl9pPr marL="3657509" indent="0">
               <a:buNone/>
               <a:defRPr sz="1600" b="1"/>
             </a:lvl9pPr>
@@ -3796,7 +3800,7 @@
         </p:nvSpPr>
         <p:spPr>
           <a:xfrm>
-            <a:off x="5088384" y="2737245"/>
+            <a:off x="5088385" y="2737247"/>
             <a:ext cx="4185617" cy="3304117"/>
           </a:xfrm>
         </p:spPr>
@@ -3918,7 +3922,7 @@
   <p:clrMapOvr>
     <a:masterClrMapping/>
   </p:clrMapOvr>
-  <p:extLst>
+  <p:extLst mod="1">
     <p:ext uri="{DCECCB84-F9BA-43D5-87BE-67443E8EF086}">
       <p15:sldGuideLst xmlns:p15="http://schemas.microsoft.com/office/powerpoint/2012/main"/>
     </p:ext>
@@ -3955,7 +3959,7 @@
         </p:nvSpPr>
         <p:spPr>
           <a:xfrm>
-            <a:off x="677334" y="609600"/>
+            <a:off x="677335" y="609600"/>
             <a:ext cx="8596668" cy="1320800"/>
           </a:xfrm>
         </p:spPr>
@@ -4141,7 +4145,7 @@
   <p:clrMapOvr>
     <a:masterClrMapping/>
   </p:clrMapOvr>
-  <p:extLst>
+  <p:extLst mod="1">
     <p:ext uri="{DCECCB84-F9BA-43D5-87BE-67443E8EF086}">
       <p15:sldGuideLst xmlns:p15="http://schemas.microsoft.com/office/powerpoint/2012/main"/>
     </p:ext>
@@ -4178,7 +4182,7 @@
         </p:nvSpPr>
         <p:spPr>
           <a:xfrm>
-            <a:off x="677334" y="1498604"/>
+            <a:off x="677335" y="1498604"/>
             <a:ext cx="3854528" cy="1278466"/>
           </a:xfrm>
         </p:spPr>
@@ -4212,7 +4216,7 @@
         </p:nvSpPr>
         <p:spPr>
           <a:xfrm>
-            <a:off x="4760461" y="514924"/>
+            <a:off x="4760462" y="514926"/>
             <a:ext cx="4513541" cy="5526437"/>
           </a:xfrm>
         </p:spPr>
@@ -4271,7 +4275,7 @@
         </p:nvSpPr>
         <p:spPr>
           <a:xfrm>
-            <a:off x="677334" y="2777069"/>
+            <a:off x="677335" y="2777069"/>
             <a:ext cx="3854528" cy="2584449"/>
           </a:xfrm>
         </p:spPr>
@@ -4284,35 +4288,35 @@
               <a:buNone/>
               <a:defRPr sz="1400"/>
             </a:lvl1pPr>
-            <a:lvl2pPr marL="457063" indent="0">
+            <a:lvl2pPr marL="457051" indent="0">
               <a:buNone/>
               <a:defRPr sz="1400"/>
             </a:lvl2pPr>
-            <a:lvl3pPr marL="914126" indent="0">
+            <a:lvl3pPr marL="914104" indent="0">
               <a:buNone/>
               <a:defRPr sz="1200"/>
             </a:lvl3pPr>
-            <a:lvl4pPr marL="1371189" indent="0">
+            <a:lvl4pPr marL="1371155" indent="0">
               <a:buNone/>
               <a:defRPr sz="1000"/>
             </a:lvl4pPr>
-            <a:lvl5pPr marL="1828251" indent="0">
+            <a:lvl5pPr marL="1828205" indent="0">
               <a:buNone/>
               <a:defRPr sz="1000"/>
             </a:lvl5pPr>
-            <a:lvl6pPr marL="2285314" indent="0">
+            <a:lvl6pPr marL="2285258" indent="0">
               <a:buNone/>
               <a:defRPr sz="1000"/>
             </a:lvl6pPr>
-            <a:lvl7pPr marL="2742377" indent="0">
+            <a:lvl7pPr marL="2742309" indent="0">
               <a:buNone/>
               <a:defRPr sz="1000"/>
             </a:lvl7pPr>
-            <a:lvl8pPr marL="3199440" indent="0">
+            <a:lvl8pPr marL="3199360" indent="0">
               <a:buNone/>
               <a:defRPr sz="1000"/>
             </a:lvl8pPr>
-            <a:lvl9pPr marL="3656503" indent="0">
+            <a:lvl9pPr marL="3656411" indent="0">
               <a:buNone/>
               <a:defRPr sz="1000"/>
             </a:lvl9pPr>
@@ -4401,7 +4405,7 @@
   <p:clrMapOvr>
     <a:masterClrMapping/>
   </p:clrMapOvr>
-  <p:extLst>
+  <p:extLst mod="1">
     <p:ext uri="{DCECCB84-F9BA-43D5-87BE-67443E8EF086}">
       <p15:sldGuideLst xmlns:p15="http://schemas.microsoft.com/office/powerpoint/2012/main"/>
     </p:ext>
@@ -4438,7 +4442,7 @@
         </p:nvSpPr>
         <p:spPr>
           <a:xfrm>
-            <a:off x="677334" y="4800600"/>
+            <a:off x="677335" y="4800600"/>
             <a:ext cx="8596667" cy="566738"/>
           </a:xfrm>
         </p:spPr>
@@ -4472,7 +4476,7 @@
         </p:nvSpPr>
         <p:spPr>
           <a:xfrm>
-            <a:off x="677334" y="609600"/>
+            <a:off x="677335" y="609600"/>
             <a:ext cx="8596668" cy="3845718"/>
           </a:xfrm>
         </p:spPr>
@@ -4485,35 +4489,35 @@
               <a:buNone/>
               <a:defRPr sz="1600"/>
             </a:lvl1pPr>
-            <a:lvl2pPr marL="457200" indent="0">
+            <a:lvl2pPr marL="457189" indent="0">
               <a:buNone/>
               <a:defRPr sz="1600"/>
             </a:lvl2pPr>
-            <a:lvl3pPr marL="914400" indent="0">
+            <a:lvl3pPr marL="914377" indent="0">
               <a:buNone/>
               <a:defRPr sz="1600"/>
             </a:lvl3pPr>
-            <a:lvl4pPr marL="1371600" indent="0">
+            <a:lvl4pPr marL="1371566" indent="0">
               <a:buNone/>
               <a:defRPr sz="1600"/>
             </a:lvl4pPr>
-            <a:lvl5pPr marL="1828800" indent="0">
+            <a:lvl5pPr marL="1828754" indent="0">
               <a:buNone/>
               <a:defRPr sz="1600"/>
             </a:lvl5pPr>
-            <a:lvl6pPr marL="2286000" indent="0">
+            <a:lvl6pPr marL="2285943" indent="0">
               <a:buNone/>
               <a:defRPr sz="1600"/>
             </a:lvl6pPr>
-            <a:lvl7pPr marL="2743200" indent="0">
+            <a:lvl7pPr marL="2743131" indent="0">
               <a:buNone/>
               <a:defRPr sz="1600"/>
             </a:lvl7pPr>
-            <a:lvl8pPr marL="3200400" indent="0">
+            <a:lvl8pPr marL="3200320" indent="0">
               <a:buNone/>
               <a:defRPr sz="1600"/>
             </a:lvl8pPr>
-            <a:lvl9pPr marL="3657600" indent="0">
+            <a:lvl9pPr marL="3657509" indent="0">
               <a:buNone/>
               <a:defRPr sz="1600"/>
             </a:lvl9pPr>
@@ -4539,7 +4543,7 @@
         </p:nvSpPr>
         <p:spPr>
           <a:xfrm>
-            <a:off x="677334" y="5367338"/>
+            <a:off x="677335" y="5367338"/>
             <a:ext cx="8596667" cy="674024"/>
           </a:xfrm>
         </p:spPr>
@@ -4552,35 +4556,35 @@
               <a:buNone/>
               <a:defRPr sz="1200"/>
             </a:lvl1pPr>
-            <a:lvl2pPr marL="457200" indent="0">
+            <a:lvl2pPr marL="457189" indent="0">
               <a:buNone/>
               <a:defRPr sz="1200"/>
             </a:lvl2pPr>
-            <a:lvl3pPr marL="914400" indent="0">
+            <a:lvl3pPr marL="914377" indent="0">
               <a:buNone/>
               <a:defRPr sz="1000"/>
             </a:lvl3pPr>
-            <a:lvl4pPr marL="1371600" indent="0">
+            <a:lvl4pPr marL="1371566" indent="0">
               <a:buNone/>
               <a:defRPr sz="900"/>
             </a:lvl4pPr>
-            <a:lvl5pPr marL="1828800" indent="0">
+            <a:lvl5pPr marL="1828754" indent="0">
               <a:buNone/>
               <a:defRPr sz="900"/>
             </a:lvl5pPr>
-            <a:lvl6pPr marL="2286000" indent="0">
+            <a:lvl6pPr marL="2285943" indent="0">
               <a:buNone/>
               <a:defRPr sz="900"/>
             </a:lvl6pPr>
-            <a:lvl7pPr marL="2743200" indent="0">
+            <a:lvl7pPr marL="2743131" indent="0">
               <a:buNone/>
               <a:defRPr sz="900"/>
             </a:lvl7pPr>
-            <a:lvl8pPr marL="3200400" indent="0">
+            <a:lvl8pPr marL="3200320" indent="0">
               <a:buNone/>
               <a:defRPr sz="900"/>
             </a:lvl8pPr>
-            <a:lvl9pPr marL="3657600" indent="0">
+            <a:lvl9pPr marL="3657509" indent="0">
               <a:buNone/>
               <a:defRPr sz="900"/>
             </a:lvl9pPr>
@@ -5236,7 +5240,7 @@
         </p:nvSpPr>
         <p:spPr>
           <a:xfrm>
-            <a:off x="677334" y="609600"/>
+            <a:off x="677335" y="609600"/>
             <a:ext cx="8596668" cy="1320800"/>
           </a:xfrm>
           <a:prstGeom prst="rect">
@@ -5269,7 +5273,7 @@
         </p:nvSpPr>
         <p:spPr>
           <a:xfrm>
-            <a:off x="677334" y="2160589"/>
+            <a:off x="677335" y="2160590"/>
             <a:ext cx="8596668" cy="3880773"/>
           </a:xfrm>
           <a:prstGeom prst="rect">
@@ -5331,7 +5335,7 @@
         </p:nvSpPr>
         <p:spPr>
           <a:xfrm>
-            <a:off x="7205133" y="6041362"/>
+            <a:off x="7205133" y="6041364"/>
             <a:ext cx="911939" cy="365125"/>
           </a:xfrm>
           <a:prstGeom prst="rect">
@@ -5372,7 +5376,7 @@
         </p:nvSpPr>
         <p:spPr>
           <a:xfrm>
-            <a:off x="677334" y="6041362"/>
+            <a:off x="677335" y="6041364"/>
             <a:ext cx="6297612" cy="365125"/>
           </a:xfrm>
           <a:prstGeom prst="rect">
@@ -5409,7 +5413,7 @@
         </p:nvSpPr>
         <p:spPr>
           <a:xfrm>
-            <a:off x="8590663" y="6041362"/>
+            <a:off x="8590664" y="6041364"/>
             <a:ext cx="683339" cy="365125"/>
           </a:xfrm>
           <a:prstGeom prst="rect">
@@ -5464,7 +5468,7 @@
   </p:sldLayoutIdLst>
   <p:txStyles>
     <p:titleStyle>
-      <a:lvl1pPr algn="l" defTabSz="457200" rtl="0" eaLnBrk="1" latinLnBrk="0" hangingPunct="1">
+      <a:lvl1pPr algn="l" defTabSz="457189" rtl="0" eaLnBrk="1" latinLnBrk="0" hangingPunct="1">
         <a:spcBef>
           <a:spcPct val="0"/>
         </a:spcBef>
@@ -5536,7 +5540,7 @@
       </a:lvl9pPr>
     </p:titleStyle>
     <p:bodyStyle>
-      <a:lvl1pPr marL="342900" indent="-342900" algn="l" defTabSz="457200" rtl="0" eaLnBrk="1" latinLnBrk="0" hangingPunct="1">
+      <a:lvl1pPr marL="342891" indent="-342891" algn="l" defTabSz="457189" rtl="0" eaLnBrk="1" latinLnBrk="0" hangingPunct="1">
         <a:spcBef>
           <a:spcPts val="1000"/>
         </a:spcBef>
@@ -5561,7 +5565,7 @@
           <a:cs typeface="+mn-cs"/>
         </a:defRPr>
       </a:lvl1pPr>
-      <a:lvl2pPr marL="742950" indent="-285750" algn="l" defTabSz="457200" rtl="0" eaLnBrk="1" latinLnBrk="0" hangingPunct="1">
+      <a:lvl2pPr marL="742932" indent="-285744" algn="l" defTabSz="457189" rtl="0" eaLnBrk="1" latinLnBrk="0" hangingPunct="1">
         <a:spcBef>
           <a:spcPts val="1000"/>
         </a:spcBef>
@@ -5586,7 +5590,7 @@
           <a:cs typeface="+mn-cs"/>
         </a:defRPr>
       </a:lvl2pPr>
-      <a:lvl3pPr marL="1143000" indent="-228600" algn="l" defTabSz="457200" rtl="0" eaLnBrk="1" latinLnBrk="0" hangingPunct="1">
+      <a:lvl3pPr marL="1142971" indent="-228594" algn="l" defTabSz="457189" rtl="0" eaLnBrk="1" latinLnBrk="0" hangingPunct="1">
         <a:spcBef>
           <a:spcPts val="1000"/>
         </a:spcBef>
@@ -5611,7 +5615,7 @@
           <a:cs typeface="+mn-cs"/>
         </a:defRPr>
       </a:lvl3pPr>
-      <a:lvl4pPr marL="1600200" indent="-228600" algn="l" defTabSz="457200" rtl="0" eaLnBrk="1" latinLnBrk="0" hangingPunct="1">
+      <a:lvl4pPr marL="1600160" indent="-228594" algn="l" defTabSz="457189" rtl="0" eaLnBrk="1" latinLnBrk="0" hangingPunct="1">
         <a:spcBef>
           <a:spcPts val="1000"/>
         </a:spcBef>
@@ -5636,7 +5640,7 @@
           <a:cs typeface="+mn-cs"/>
         </a:defRPr>
       </a:lvl4pPr>
-      <a:lvl5pPr marL="2057400" indent="-228600" algn="l" defTabSz="457200" rtl="0" eaLnBrk="1" latinLnBrk="0" hangingPunct="1">
+      <a:lvl5pPr marL="2057349" indent="-228594" algn="l" defTabSz="457189" rtl="0" eaLnBrk="1" latinLnBrk="0" hangingPunct="1">
         <a:spcBef>
           <a:spcPts val="1000"/>
         </a:spcBef>
@@ -5661,7 +5665,7 @@
           <a:cs typeface="+mn-cs"/>
         </a:defRPr>
       </a:lvl5pPr>
-      <a:lvl6pPr marL="2514600" indent="-228600" algn="l" defTabSz="457200" rtl="0" eaLnBrk="1" latinLnBrk="0" hangingPunct="1">
+      <a:lvl6pPr marL="2514537" indent="-228594" algn="l" defTabSz="457189" rtl="0" eaLnBrk="1" latinLnBrk="0" hangingPunct="1">
         <a:spcBef>
           <a:spcPts val="1000"/>
         </a:spcBef>
@@ -5686,7 +5690,7 @@
           <a:cs typeface="+mn-cs"/>
         </a:defRPr>
       </a:lvl6pPr>
-      <a:lvl7pPr marL="2971800" indent="-228600" algn="l" defTabSz="457200" rtl="0" eaLnBrk="1" latinLnBrk="0" hangingPunct="1">
+      <a:lvl7pPr marL="2971726" indent="-228594" algn="l" defTabSz="457189" rtl="0" eaLnBrk="1" latinLnBrk="0" hangingPunct="1">
         <a:spcBef>
           <a:spcPts val="1000"/>
         </a:spcBef>
@@ -5711,7 +5715,7 @@
           <a:cs typeface="+mn-cs"/>
         </a:defRPr>
       </a:lvl7pPr>
-      <a:lvl8pPr marL="3429000" indent="-228600" algn="l" defTabSz="457200" rtl="0" eaLnBrk="1" latinLnBrk="0" hangingPunct="1">
+      <a:lvl8pPr marL="3428914" indent="-228594" algn="l" defTabSz="457189" rtl="0" eaLnBrk="1" latinLnBrk="0" hangingPunct="1">
         <a:spcBef>
           <a:spcPts val="1000"/>
         </a:spcBef>
@@ -5736,7 +5740,7 @@
           <a:cs typeface="+mn-cs"/>
         </a:defRPr>
       </a:lvl8pPr>
-      <a:lvl9pPr marL="3886200" indent="-228600" algn="l" defTabSz="457200" rtl="0" eaLnBrk="1" latinLnBrk="0" hangingPunct="1">
+      <a:lvl9pPr marL="3886103" indent="-228594" algn="l" defTabSz="457189" rtl="0" eaLnBrk="1" latinLnBrk="0" hangingPunct="1">
         <a:spcBef>
           <a:spcPts val="1000"/>
         </a:spcBef>
@@ -5766,7 +5770,7 @@
       <a:defPPr>
         <a:defRPr lang="en-US"/>
       </a:defPPr>
-      <a:lvl1pPr marL="0" algn="l" defTabSz="457200" rtl="0" eaLnBrk="1" latinLnBrk="0" hangingPunct="1">
+      <a:lvl1pPr marL="0" algn="l" defTabSz="457189" rtl="0" eaLnBrk="1" latinLnBrk="0" hangingPunct="1">
         <a:defRPr sz="1800" kern="1200">
           <a:solidFill>
             <a:schemeClr val="tx1"/>
@@ -5776,7 +5780,7 @@
           <a:cs typeface="+mn-cs"/>
         </a:defRPr>
       </a:lvl1pPr>
-      <a:lvl2pPr marL="457200" algn="l" defTabSz="457200" rtl="0" eaLnBrk="1" latinLnBrk="0" hangingPunct="1">
+      <a:lvl2pPr marL="457189" algn="l" defTabSz="457189" rtl="0" eaLnBrk="1" latinLnBrk="0" hangingPunct="1">
         <a:defRPr sz="1800" kern="1200">
           <a:solidFill>
             <a:schemeClr val="tx1"/>
@@ -5786,7 +5790,7 @@
           <a:cs typeface="+mn-cs"/>
         </a:defRPr>
       </a:lvl2pPr>
-      <a:lvl3pPr marL="914400" algn="l" defTabSz="457200" rtl="0" eaLnBrk="1" latinLnBrk="0" hangingPunct="1">
+      <a:lvl3pPr marL="914377" algn="l" defTabSz="457189" rtl="0" eaLnBrk="1" latinLnBrk="0" hangingPunct="1">
         <a:defRPr sz="1800" kern="1200">
           <a:solidFill>
             <a:schemeClr val="tx1"/>
@@ -5796,7 +5800,7 @@
           <a:cs typeface="+mn-cs"/>
         </a:defRPr>
       </a:lvl3pPr>
-      <a:lvl4pPr marL="1371600" algn="l" defTabSz="457200" rtl="0" eaLnBrk="1" latinLnBrk="0" hangingPunct="1">
+      <a:lvl4pPr marL="1371566" algn="l" defTabSz="457189" rtl="0" eaLnBrk="1" latinLnBrk="0" hangingPunct="1">
         <a:defRPr sz="1800" kern="1200">
           <a:solidFill>
             <a:schemeClr val="tx1"/>
@@ -5806,7 +5810,7 @@
           <a:cs typeface="+mn-cs"/>
         </a:defRPr>
       </a:lvl4pPr>
-      <a:lvl5pPr marL="1828800" algn="l" defTabSz="457200" rtl="0" eaLnBrk="1" latinLnBrk="0" hangingPunct="1">
+      <a:lvl5pPr marL="1828754" algn="l" defTabSz="457189" rtl="0" eaLnBrk="1" latinLnBrk="0" hangingPunct="1">
         <a:defRPr sz="1800" kern="1200">
           <a:solidFill>
             <a:schemeClr val="tx1"/>
@@ -5816,7 +5820,7 @@
           <a:cs typeface="+mn-cs"/>
         </a:defRPr>
       </a:lvl5pPr>
-      <a:lvl6pPr marL="2286000" algn="l" defTabSz="457200" rtl="0" eaLnBrk="1" latinLnBrk="0" hangingPunct="1">
+      <a:lvl6pPr marL="2285943" algn="l" defTabSz="457189" rtl="0" eaLnBrk="1" latinLnBrk="0" hangingPunct="1">
         <a:defRPr sz="1800" kern="1200">
           <a:solidFill>
             <a:schemeClr val="tx1"/>
@@ -5826,7 +5830,7 @@
           <a:cs typeface="+mn-cs"/>
         </a:defRPr>
       </a:lvl6pPr>
-      <a:lvl7pPr marL="2743200" algn="l" defTabSz="457200" rtl="0" eaLnBrk="1" latinLnBrk="0" hangingPunct="1">
+      <a:lvl7pPr marL="2743131" algn="l" defTabSz="457189" rtl="0" eaLnBrk="1" latinLnBrk="0" hangingPunct="1">
         <a:defRPr sz="1800" kern="1200">
           <a:solidFill>
             <a:schemeClr val="tx1"/>
@@ -5836,7 +5840,7 @@
           <a:cs typeface="+mn-cs"/>
         </a:defRPr>
       </a:lvl7pPr>
-      <a:lvl8pPr marL="3200400" algn="l" defTabSz="457200" rtl="0" eaLnBrk="1" latinLnBrk="0" hangingPunct="1">
+      <a:lvl8pPr marL="3200320" algn="l" defTabSz="457189" rtl="0" eaLnBrk="1" latinLnBrk="0" hangingPunct="1">
         <a:defRPr sz="1800" kern="1200">
           <a:solidFill>
             <a:schemeClr val="tx1"/>
@@ -5846,7 +5850,7 @@
           <a:cs typeface="+mn-cs"/>
         </a:defRPr>
       </a:lvl8pPr>
-      <a:lvl9pPr marL="3657600" algn="l" defTabSz="457200" rtl="0" eaLnBrk="1" latinLnBrk="0" hangingPunct="1">
+      <a:lvl9pPr marL="3657509" algn="l" defTabSz="457189" rtl="0" eaLnBrk="1" latinLnBrk="0" hangingPunct="1">
         <a:defRPr sz="1800" kern="1200">
           <a:solidFill>
             <a:schemeClr val="tx1"/>
@@ -5858,7 +5862,7 @@
       </a:lvl9pPr>
     </p:otherStyle>
   </p:txStyles>
-  <p:extLst>
+  <p:extLst mod="1">
     <p:ext uri="{27BBF7A9-308A-43DC-89C8-2F10F3537804}">
       <p15:sldGuideLst xmlns:p15="http://schemas.microsoft.com/office/powerpoint/2012/main"/>
     </p:ext>
@@ -5918,7 +5922,7 @@
         </p:nvSpPr>
         <p:spPr>
           <a:xfrm>
-            <a:off x="1507067" y="4050833"/>
+            <a:off x="1507067" y="4050834"/>
             <a:ext cx="7766936" cy="405053"/>
           </a:xfrm>
         </p:spPr>
@@ -5956,7 +5960,7 @@
         </p:nvSpPr>
         <p:spPr>
           <a:xfrm>
-            <a:off x="1507067" y="4455886"/>
+            <a:off x="1507067" y="4455887"/>
             <a:ext cx="7766936" cy="1393371"/>
           </a:xfrm>
           <a:prstGeom prst="rect">
@@ -6188,44 +6192,44 @@
           </a:lstStyle>
           <a:p>
             <a:r>
-              <a:rPr lang="es-ES" dirty="0" err="1" smtClean="0"/>
+              <a:rPr lang="es-ES" dirty="0" err="1"/>
               <a:t>Team</a:t>
             </a:r>
             <a:r>
-              <a:rPr lang="es-ES" dirty="0" smtClean="0"/>
+              <a:rPr lang="es-ES" dirty="0"/>
               <a:t> </a:t>
             </a:r>
             <a:r>
-              <a:rPr lang="es-ES" dirty="0" err="1" smtClean="0"/>
+              <a:rPr lang="es-ES" dirty="0" err="1"/>
               <a:t>Rocket</a:t>
             </a:r>
             <a:r>
-              <a:rPr lang="es-ES" dirty="0" smtClean="0"/>
+              <a:rPr lang="es-ES" dirty="0"/>
               <a:t>:</a:t>
             </a:r>
           </a:p>
           <a:p>
             <a:r>
-              <a:rPr lang="es-ES" dirty="0" smtClean="0"/>
+              <a:rPr lang="es-ES" dirty="0"/>
               <a:t>Jos</a:t>
             </a:r>
             <a:r>
-              <a:rPr lang="es-ES" dirty="0" smtClean="0"/>
+              <a:rPr lang="es-ES" dirty="0"/>
               <a:t>é Fernando Dávila</a:t>
             </a:r>
           </a:p>
           <a:p>
             <a:r>
-              <a:rPr lang="es-ES" dirty="0" smtClean="0"/>
+              <a:rPr lang="es-ES" dirty="0"/>
               <a:t>Julio César Aguilar</a:t>
             </a:r>
           </a:p>
           <a:p>
             <a:r>
-              <a:rPr lang="es-ES" dirty="0" smtClean="0"/>
+              <a:rPr lang="es-ES" dirty="0"/>
               <a:t>José Carlos Villarreal</a:t>
             </a:r>
-            <a:endParaRPr lang="es-ES" dirty="0" smtClean="0"/>
+            <a:endParaRPr lang="es-ES" dirty="0"/>
           </a:p>
           <a:p>
             <a:endParaRPr lang="en-GB" dirty="0"/>
@@ -6279,7 +6283,7 @@
           <a:p>
             <a:r>
               <a:rPr lang="en-GB" dirty="0" smtClean="0"/>
-              <a:t>Cameras</a:t>
+              <a:t>Layout and Composition</a:t>
             </a:r>
             <a:endParaRPr lang="en-GB" dirty="0"/>
           </a:p>
@@ -6302,55 +6306,14 @@
           <a:p>
             <a:r>
               <a:rPr lang="en-GB" dirty="0" smtClean="0"/>
-              <a:t>Describe your camera setup</a:t>
+              <a:t>Describe your general Layout</a:t>
             </a:r>
           </a:p>
           <a:p>
             <a:r>
               <a:rPr lang="en-GB" dirty="0" smtClean="0"/>
-              <a:t>For each camera, describe the type of scene you are creating (</a:t>
-            </a:r>
-            <a:r>
-              <a:rPr lang="en-GB" dirty="0" err="1" smtClean="0"/>
-              <a:t>closeup</a:t>
-            </a:r>
-            <a:r>
-              <a:rPr lang="en-GB" dirty="0" smtClean="0"/>
-              <a:t>, reverse, </a:t>
-            </a:r>
-            <a:r>
-              <a:rPr lang="en-GB" dirty="0" err="1" smtClean="0"/>
-              <a:t>pov</a:t>
-            </a:r>
-            <a:r>
-              <a:rPr lang="en-GB" dirty="0" smtClean="0"/>
-              <a:t>, </a:t>
-            </a:r>
-            <a:r>
-              <a:rPr lang="en-GB" dirty="0" err="1" smtClean="0"/>
-              <a:t>etc</a:t>
-            </a:r>
-            <a:r>
-              <a:rPr lang="en-GB" dirty="0" smtClean="0"/>
-              <a:t>), the lenses and the aspect ratio (width vs height)</a:t>
-            </a:r>
-          </a:p>
-          <a:p>
-            <a:r>
-              <a:rPr lang="en-GB" dirty="0" smtClean="0"/>
-              <a:t>Describe why views are interesting</a:t>
-            </a:r>
-          </a:p>
-          <a:p>
-            <a:r>
-              <a:rPr lang="en-GB" dirty="0" smtClean="0"/>
-              <a:t>Discuss if shadows give you more realism</a:t>
-            </a:r>
-          </a:p>
-          <a:p>
-            <a:pPr marL="0" indent="0">
-              <a:buNone/>
-            </a:pPr>
+              <a:t>For the most important objects, describe why their are placed in the scene in such way</a:t>
+            </a:r>
             <a:endParaRPr lang="en-GB" dirty="0"/>
           </a:p>
         </p:txBody>
@@ -6358,13 +6321,20 @@
     </p:spTree>
     <p:extLst>
       <p:ext uri="{BB962C8B-B14F-4D97-AF65-F5344CB8AC3E}">
-        <p14:creationId xmlns:p14="http://schemas.microsoft.com/office/powerpoint/2010/main" val="2016707975"/>
+        <p14:creationId xmlns:p14="http://schemas.microsoft.com/office/powerpoint/2010/main" val="3334049960"/>
       </p:ext>
     </p:extLst>
   </p:cSld>
   <p:clrMapOvr>
     <a:masterClrMapping/>
   </p:clrMapOvr>
+  <p:timing>
+    <p:tnLst>
+      <p:par>
+        <p:cTn id="1" dur="indefinite" restart="never" nodeType="tmRoot"/>
+      </p:par>
+    </p:tnLst>
+  </p:timing>
 </p:sld>
 </file>
 
@@ -6402,7 +6372,7 @@
           <a:p>
             <a:r>
               <a:rPr lang="en-GB" dirty="0" smtClean="0"/>
-              <a:t>Conclusions</a:t>
+              <a:t>Cameras</a:t>
             </a:r>
             <a:endParaRPr lang="en-GB" dirty="0"/>
           </a:p>
@@ -6430,13 +6400,20 @@
     </p:spTree>
     <p:extLst>
       <p:ext uri="{BB962C8B-B14F-4D97-AF65-F5344CB8AC3E}">
-        <p14:creationId xmlns:p14="http://schemas.microsoft.com/office/powerpoint/2010/main" val="1454404448"/>
+        <p14:creationId xmlns:p14="http://schemas.microsoft.com/office/powerpoint/2010/main" val="1865273154"/>
       </p:ext>
     </p:extLst>
   </p:cSld>
   <p:clrMapOvr>
     <a:masterClrMapping/>
   </p:clrMapOvr>
+  <p:timing>
+    <p:tnLst>
+      <p:par>
+        <p:cTn id="1" dur="indefinite" restart="never" nodeType="tmRoot"/>
+      </p:par>
+    </p:tnLst>
+  </p:timing>
 </p:sld>
 </file>
 
@@ -6474,7 +6451,7 @@
           <a:p>
             <a:r>
               <a:rPr lang="en-GB" dirty="0" smtClean="0"/>
-              <a:t>Technical Conclusions</a:t>
+              <a:t>Illumination</a:t>
             </a:r>
             <a:endParaRPr lang="en-GB" dirty="0"/>
           </a:p>
@@ -6497,19 +6474,13 @@
           <a:p>
             <a:r>
               <a:rPr lang="en-GB" dirty="0" smtClean="0"/>
-              <a:t>Discuss technical issues you encountered</a:t>
+              <a:t>Describe the illumination scheme</a:t>
             </a:r>
           </a:p>
           <a:p>
             <a:r>
               <a:rPr lang="en-GB" dirty="0" smtClean="0"/>
-              <a:t>Describe important facts, actions and observations</a:t>
-            </a:r>
-          </a:p>
-          <a:p>
-            <a:r>
-              <a:rPr lang="en-GB" dirty="0" smtClean="0"/>
-              <a:t>Discuss additional thoughts about the project</a:t>
+              <a:t>Describe why you chose such illumination scheme</a:t>
             </a:r>
             <a:endParaRPr lang="en-GB" dirty="0"/>
           </a:p>
@@ -6518,7 +6489,7 @@
     </p:spTree>
     <p:extLst>
       <p:ext uri="{BB962C8B-B14F-4D97-AF65-F5344CB8AC3E}">
-        <p14:creationId xmlns:p14="http://schemas.microsoft.com/office/powerpoint/2010/main" val="3027845768"/>
+        <p14:creationId xmlns:p14="http://schemas.microsoft.com/office/powerpoint/2010/main" val="181089961"/>
       </p:ext>
     </p:extLst>
   </p:cSld>
@@ -6562,7 +6533,7 @@
           <a:p>
             <a:r>
               <a:rPr lang="en-GB" dirty="0" smtClean="0"/>
-              <a:t>Ethical Conclusions</a:t>
+              <a:t>Cameras</a:t>
             </a:r>
             <a:endParaRPr lang="en-GB" dirty="0"/>
           </a:p>
@@ -6585,14 +6556,55 @@
           <a:p>
             <a:r>
               <a:rPr lang="en-GB" dirty="0" smtClean="0"/>
-              <a:t>Discuss how your project relates to our responsibilities as a professionals</a:t>
+              <a:t>Describe your camera setup</a:t>
             </a:r>
           </a:p>
           <a:p>
             <a:r>
               <a:rPr lang="en-GB" dirty="0" smtClean="0"/>
-              <a:t>If you wish, discuss how you project relates to human morality</a:t>
-            </a:r>
+              <a:t>For each camera, describe the type of scene you are creating (</a:t>
+            </a:r>
+            <a:r>
+              <a:rPr lang="en-GB" dirty="0" err="1" smtClean="0"/>
+              <a:t>closeup</a:t>
+            </a:r>
+            <a:r>
+              <a:rPr lang="en-GB" dirty="0" smtClean="0"/>
+              <a:t>, reverse, </a:t>
+            </a:r>
+            <a:r>
+              <a:rPr lang="en-GB" dirty="0" err="1" smtClean="0"/>
+              <a:t>pov</a:t>
+            </a:r>
+            <a:r>
+              <a:rPr lang="en-GB" dirty="0" smtClean="0"/>
+              <a:t>, </a:t>
+            </a:r>
+            <a:r>
+              <a:rPr lang="en-GB" dirty="0" err="1" smtClean="0"/>
+              <a:t>etc</a:t>
+            </a:r>
+            <a:r>
+              <a:rPr lang="en-GB" dirty="0" smtClean="0"/>
+              <a:t>), the lenses and the aspect ratio (width vs height)</a:t>
+            </a:r>
+          </a:p>
+          <a:p>
+            <a:r>
+              <a:rPr lang="en-GB" dirty="0" smtClean="0"/>
+              <a:t>Describe why views are interesting</a:t>
+            </a:r>
+          </a:p>
+          <a:p>
+            <a:r>
+              <a:rPr lang="en-GB" dirty="0" smtClean="0"/>
+              <a:t>Discuss if shadows give you more realism</a:t>
+            </a:r>
+          </a:p>
+          <a:p>
+            <a:pPr marL="0" indent="0">
+              <a:buNone/>
+            </a:pPr>
             <a:endParaRPr lang="en-GB" dirty="0"/>
           </a:p>
         </p:txBody>
@@ -6600,7 +6612,7 @@
     </p:spTree>
     <p:extLst>
       <p:ext uri="{BB962C8B-B14F-4D97-AF65-F5344CB8AC3E}">
-        <p14:creationId xmlns:p14="http://schemas.microsoft.com/office/powerpoint/2010/main" val="4052594474"/>
+        <p14:creationId xmlns:p14="http://schemas.microsoft.com/office/powerpoint/2010/main" val="2016707975"/>
       </p:ext>
     </p:extLst>
   </p:cSld>
@@ -6629,12 +6641,12 @@
       </p:grpSpPr>
       <p:sp>
         <p:nvSpPr>
-          <p:cNvPr id="2" name="Title 1"/>
-          <p:cNvSpPr>
-            <a:spLocks noGrp="1"/>
-          </p:cNvSpPr>
-          <p:nvPr>
-            <p:ph type="title"/>
+          <p:cNvPr id="4" name="Title 3"/>
+          <p:cNvSpPr>
+            <a:spLocks noGrp="1"/>
+          </p:cNvSpPr>
+          <p:nvPr>
+            <p:ph type="ctrTitle"/>
           </p:nvPr>
         </p:nvSpPr>
         <p:spPr/>
@@ -6644,7 +6656,7 @@
           <a:p>
             <a:r>
               <a:rPr lang="en-GB" dirty="0" smtClean="0"/>
-              <a:t>Citizenship Conclusions</a:t>
+              <a:t>Conclusions</a:t>
             </a:r>
             <a:endParaRPr lang="en-GB" dirty="0"/>
           </a:p>
@@ -6652,12 +6664,12 @@
       </p:sp>
       <p:sp>
         <p:nvSpPr>
-          <p:cNvPr id="3" name="Content Placeholder 2"/>
-          <p:cNvSpPr>
-            <a:spLocks noGrp="1"/>
-          </p:cNvSpPr>
-          <p:nvPr>
-            <p:ph idx="1"/>
+          <p:cNvPr id="5" name="Subtitle 4"/>
+          <p:cNvSpPr>
+            <a:spLocks noGrp="1"/>
+          </p:cNvSpPr>
+          <p:nvPr>
+            <p:ph type="subTitle" idx="1"/>
           </p:nvPr>
         </p:nvSpPr>
         <p:spPr/>
@@ -6665,32 +6677,14 @@
           <a:bodyPr/>
           <a:lstStyle/>
           <a:p>
-            <a:r>
-              <a:rPr lang="en-GB" dirty="0" smtClean="0"/>
-              <a:t>Discuss how your project relates to our responsibilities as citizens of a community, a country and the world</a:t>
-            </a:r>
-          </a:p>
-          <a:p>
-            <a:r>
-              <a:rPr lang="en-GB" dirty="0" smtClean="0"/>
-              <a:t>Discuss how the project relates to </a:t>
-            </a:r>
-            <a:r>
-              <a:rPr lang="en-GB" smtClean="0"/>
-              <a:t>your immediate </a:t>
-            </a:r>
-            <a:r>
-              <a:rPr lang="en-GB" dirty="0" smtClean="0"/>
-              <a:t>community</a:t>
-            </a:r>
-            <a:endParaRPr lang="en-GB" dirty="0"/>
+            <a:endParaRPr lang="en-GB"/>
           </a:p>
         </p:txBody>
       </p:sp>
     </p:spTree>
     <p:extLst>
       <p:ext uri="{BB962C8B-B14F-4D97-AF65-F5344CB8AC3E}">
-        <p14:creationId xmlns:p14="http://schemas.microsoft.com/office/powerpoint/2010/main" val="3116138423"/>
+        <p14:creationId xmlns:p14="http://schemas.microsoft.com/office/powerpoint/2010/main" val="1454404448"/>
       </p:ext>
     </p:extLst>
   </p:cSld>
@@ -6734,6 +6728,266 @@
           <a:p>
             <a:r>
               <a:rPr lang="en-GB" dirty="0" smtClean="0"/>
+              <a:t>Technical Conclusions</a:t>
+            </a:r>
+            <a:endParaRPr lang="en-GB" dirty="0"/>
+          </a:p>
+        </p:txBody>
+      </p:sp>
+      <p:sp>
+        <p:nvSpPr>
+          <p:cNvPr id="3" name="Content Placeholder 2"/>
+          <p:cNvSpPr>
+            <a:spLocks noGrp="1"/>
+          </p:cNvSpPr>
+          <p:nvPr>
+            <p:ph idx="1"/>
+          </p:nvPr>
+        </p:nvSpPr>
+        <p:spPr/>
+        <p:txBody>
+          <a:bodyPr/>
+          <a:lstStyle/>
+          <a:p>
+            <a:r>
+              <a:rPr lang="en-GB" dirty="0" smtClean="0"/>
+              <a:t>Discuss technical issues you encountered</a:t>
+            </a:r>
+          </a:p>
+          <a:p>
+            <a:r>
+              <a:rPr lang="en-GB" dirty="0" smtClean="0"/>
+              <a:t>Describe important facts, actions and observations</a:t>
+            </a:r>
+          </a:p>
+          <a:p>
+            <a:r>
+              <a:rPr lang="en-GB" dirty="0" smtClean="0"/>
+              <a:t>Discuss additional thoughts about the project</a:t>
+            </a:r>
+            <a:endParaRPr lang="en-GB" dirty="0"/>
+          </a:p>
+        </p:txBody>
+      </p:sp>
+    </p:spTree>
+    <p:extLst>
+      <p:ext uri="{BB962C8B-B14F-4D97-AF65-F5344CB8AC3E}">
+        <p14:creationId xmlns:p14="http://schemas.microsoft.com/office/powerpoint/2010/main" val="3027845768"/>
+      </p:ext>
+    </p:extLst>
+  </p:cSld>
+  <p:clrMapOvr>
+    <a:masterClrMapping/>
+  </p:clrMapOvr>
+</p:sld>
+</file>
+
+<file path=ppt/slides/slide16.xml><?xml version="1.0" encoding="utf-8"?>
+<p:sld xmlns:a="http://schemas.openxmlformats.org/drawingml/2006/main" xmlns:r="http://schemas.openxmlformats.org/officeDocument/2006/relationships" xmlns:p="http://schemas.openxmlformats.org/presentationml/2006/main">
+  <p:cSld>
+    <p:spTree>
+      <p:nvGrpSpPr>
+        <p:cNvPr id="1" name=""/>
+        <p:cNvGrpSpPr/>
+        <p:nvPr/>
+      </p:nvGrpSpPr>
+      <p:grpSpPr>
+        <a:xfrm>
+          <a:off x="0" y="0"/>
+          <a:ext cx="0" cy="0"/>
+          <a:chOff x="0" y="0"/>
+          <a:chExt cx="0" cy="0"/>
+        </a:xfrm>
+      </p:grpSpPr>
+      <p:sp>
+        <p:nvSpPr>
+          <p:cNvPr id="2" name="Title 1"/>
+          <p:cNvSpPr>
+            <a:spLocks noGrp="1"/>
+          </p:cNvSpPr>
+          <p:nvPr>
+            <p:ph type="title"/>
+          </p:nvPr>
+        </p:nvSpPr>
+        <p:spPr/>
+        <p:txBody>
+          <a:bodyPr/>
+          <a:lstStyle/>
+          <a:p>
+            <a:r>
+              <a:rPr lang="en-GB" dirty="0" smtClean="0"/>
+              <a:t>Ethical Conclusions</a:t>
+            </a:r>
+            <a:endParaRPr lang="en-GB" dirty="0"/>
+          </a:p>
+        </p:txBody>
+      </p:sp>
+      <p:sp>
+        <p:nvSpPr>
+          <p:cNvPr id="3" name="Content Placeholder 2"/>
+          <p:cNvSpPr>
+            <a:spLocks noGrp="1"/>
+          </p:cNvSpPr>
+          <p:nvPr>
+            <p:ph idx="1"/>
+          </p:nvPr>
+        </p:nvSpPr>
+        <p:spPr/>
+        <p:txBody>
+          <a:bodyPr/>
+          <a:lstStyle/>
+          <a:p>
+            <a:r>
+              <a:rPr lang="en-GB" dirty="0" smtClean="0"/>
+              <a:t>Discuss how your project relates to our responsibilities as a professionals</a:t>
+            </a:r>
+          </a:p>
+          <a:p>
+            <a:r>
+              <a:rPr lang="en-GB" dirty="0" smtClean="0"/>
+              <a:t>If you wish, discuss how you project relates to human morality</a:t>
+            </a:r>
+            <a:endParaRPr lang="en-GB" dirty="0"/>
+          </a:p>
+        </p:txBody>
+      </p:sp>
+    </p:spTree>
+    <p:extLst>
+      <p:ext uri="{BB962C8B-B14F-4D97-AF65-F5344CB8AC3E}">
+        <p14:creationId xmlns:p14="http://schemas.microsoft.com/office/powerpoint/2010/main" val="4052594474"/>
+      </p:ext>
+    </p:extLst>
+  </p:cSld>
+  <p:clrMapOvr>
+    <a:masterClrMapping/>
+  </p:clrMapOvr>
+</p:sld>
+</file>
+
+<file path=ppt/slides/slide17.xml><?xml version="1.0" encoding="utf-8"?>
+<p:sld xmlns:a="http://schemas.openxmlformats.org/drawingml/2006/main" xmlns:r="http://schemas.openxmlformats.org/officeDocument/2006/relationships" xmlns:p="http://schemas.openxmlformats.org/presentationml/2006/main">
+  <p:cSld>
+    <p:spTree>
+      <p:nvGrpSpPr>
+        <p:cNvPr id="1" name=""/>
+        <p:cNvGrpSpPr/>
+        <p:nvPr/>
+      </p:nvGrpSpPr>
+      <p:grpSpPr>
+        <a:xfrm>
+          <a:off x="0" y="0"/>
+          <a:ext cx="0" cy="0"/>
+          <a:chOff x="0" y="0"/>
+          <a:chExt cx="0" cy="0"/>
+        </a:xfrm>
+      </p:grpSpPr>
+      <p:sp>
+        <p:nvSpPr>
+          <p:cNvPr id="2" name="Title 1"/>
+          <p:cNvSpPr>
+            <a:spLocks noGrp="1"/>
+          </p:cNvSpPr>
+          <p:nvPr>
+            <p:ph type="title"/>
+          </p:nvPr>
+        </p:nvSpPr>
+        <p:spPr/>
+        <p:txBody>
+          <a:bodyPr/>
+          <a:lstStyle/>
+          <a:p>
+            <a:r>
+              <a:rPr lang="en-GB" dirty="0" smtClean="0"/>
+              <a:t>Citizenship Conclusions</a:t>
+            </a:r>
+            <a:endParaRPr lang="en-GB" dirty="0"/>
+          </a:p>
+        </p:txBody>
+      </p:sp>
+      <p:sp>
+        <p:nvSpPr>
+          <p:cNvPr id="3" name="Content Placeholder 2"/>
+          <p:cNvSpPr>
+            <a:spLocks noGrp="1"/>
+          </p:cNvSpPr>
+          <p:nvPr>
+            <p:ph idx="1"/>
+          </p:nvPr>
+        </p:nvSpPr>
+        <p:spPr/>
+        <p:txBody>
+          <a:bodyPr/>
+          <a:lstStyle/>
+          <a:p>
+            <a:r>
+              <a:rPr lang="en-GB" dirty="0" smtClean="0"/>
+              <a:t>Discuss how your project relates to our responsibilities as citizens of a community, a country and the world</a:t>
+            </a:r>
+          </a:p>
+          <a:p>
+            <a:r>
+              <a:rPr lang="en-GB" dirty="0" smtClean="0"/>
+              <a:t>Discuss how the project relates to </a:t>
+            </a:r>
+            <a:r>
+              <a:rPr lang="en-GB" smtClean="0"/>
+              <a:t>your immediate </a:t>
+            </a:r>
+            <a:r>
+              <a:rPr lang="en-GB" dirty="0" smtClean="0"/>
+              <a:t>community</a:t>
+            </a:r>
+            <a:endParaRPr lang="en-GB" dirty="0"/>
+          </a:p>
+        </p:txBody>
+      </p:sp>
+    </p:spTree>
+    <p:extLst>
+      <p:ext uri="{BB962C8B-B14F-4D97-AF65-F5344CB8AC3E}">
+        <p14:creationId xmlns:p14="http://schemas.microsoft.com/office/powerpoint/2010/main" val="3116138423"/>
+      </p:ext>
+    </p:extLst>
+  </p:cSld>
+  <p:clrMapOvr>
+    <a:masterClrMapping/>
+  </p:clrMapOvr>
+</p:sld>
+</file>
+
+<file path=ppt/slides/slide18.xml><?xml version="1.0" encoding="utf-8"?>
+<p:sld xmlns:a="http://schemas.openxmlformats.org/drawingml/2006/main" xmlns:r="http://schemas.openxmlformats.org/officeDocument/2006/relationships" xmlns:p="http://schemas.openxmlformats.org/presentationml/2006/main">
+  <p:cSld>
+    <p:spTree>
+      <p:nvGrpSpPr>
+        <p:cNvPr id="1" name=""/>
+        <p:cNvGrpSpPr/>
+        <p:nvPr/>
+      </p:nvGrpSpPr>
+      <p:grpSpPr>
+        <a:xfrm>
+          <a:off x="0" y="0"/>
+          <a:ext cx="0" cy="0"/>
+          <a:chOff x="0" y="0"/>
+          <a:chExt cx="0" cy="0"/>
+        </a:xfrm>
+      </p:grpSpPr>
+      <p:sp>
+        <p:nvSpPr>
+          <p:cNvPr id="2" name="Title 1"/>
+          <p:cNvSpPr>
+            <a:spLocks noGrp="1"/>
+          </p:cNvSpPr>
+          <p:nvPr>
+            <p:ph type="title"/>
+          </p:nvPr>
+        </p:nvSpPr>
+        <p:spPr/>
+        <p:txBody>
+          <a:bodyPr/>
+          <a:lstStyle/>
+          <a:p>
+            <a:r>
+              <a:rPr lang="en-GB" dirty="0" smtClean="0"/>
               <a:t>Environmental Conclusions</a:t>
             </a:r>
             <a:endParaRPr lang="en-GB" dirty="0"/>
@@ -6773,6 +7027,93 @@
     <p:extLst>
       <p:ext uri="{BB962C8B-B14F-4D97-AF65-F5344CB8AC3E}">
         <p14:creationId xmlns:p14="http://schemas.microsoft.com/office/powerpoint/2010/main" val="2722475254"/>
+      </p:ext>
+    </p:extLst>
+  </p:cSld>
+  <p:clrMapOvr>
+    <a:masterClrMapping/>
+  </p:clrMapOvr>
+</p:sld>
+</file>
+
+<file path=ppt/slides/slide19.xml><?xml version="1.0" encoding="utf-8"?>
+<p:sld xmlns:a="http://schemas.openxmlformats.org/drawingml/2006/main" xmlns:r="http://schemas.openxmlformats.org/officeDocument/2006/relationships" xmlns:p="http://schemas.openxmlformats.org/presentationml/2006/main">
+  <p:cSld>
+    <p:spTree>
+      <p:nvGrpSpPr>
+        <p:cNvPr id="1" name=""/>
+        <p:cNvGrpSpPr/>
+        <p:nvPr/>
+      </p:nvGrpSpPr>
+      <p:grpSpPr>
+        <a:xfrm>
+          <a:off x="0" y="0"/>
+          <a:ext cx="0" cy="0"/>
+          <a:chOff x="0" y="0"/>
+          <a:chExt cx="0" cy="0"/>
+        </a:xfrm>
+      </p:grpSpPr>
+      <p:sp>
+        <p:nvSpPr>
+          <p:cNvPr id="2" name="Title 1"/>
+          <p:cNvSpPr>
+            <a:spLocks noGrp="1"/>
+          </p:cNvSpPr>
+          <p:nvPr>
+            <p:ph type="title"/>
+          </p:nvPr>
+        </p:nvSpPr>
+        <p:spPr/>
+        <p:txBody>
+          <a:bodyPr/>
+          <a:lstStyle/>
+          <a:p>
+            <a:r>
+              <a:rPr lang="en-GB" dirty="0" smtClean="0"/>
+              <a:t>References</a:t>
+            </a:r>
+            <a:endParaRPr lang="en-GB" dirty="0"/>
+          </a:p>
+        </p:txBody>
+      </p:sp>
+      <p:sp>
+        <p:nvSpPr>
+          <p:cNvPr id="3" name="Content Placeholder 2"/>
+          <p:cNvSpPr>
+            <a:spLocks noGrp="1"/>
+          </p:cNvSpPr>
+          <p:nvPr>
+            <p:ph idx="1"/>
+          </p:nvPr>
+        </p:nvSpPr>
+        <p:spPr/>
+        <p:txBody>
+          <a:bodyPr/>
+          <a:lstStyle/>
+          <a:p>
+            <a:r>
+              <a:rPr lang="en-GB" dirty="0">
+                <a:hlinkClick r:id="rId2"/>
+              </a:rPr>
+              <a:t>https://</a:t>
+            </a:r>
+            <a:r>
+              <a:rPr lang="en-GB" dirty="0" smtClean="0">
+                <a:hlinkClick r:id="rId2"/>
+              </a:rPr>
+              <a:t>www.pokemon.com/es/pokedex/pikachu</a:t>
+            </a:r>
+            <a:endParaRPr lang="en-GB" dirty="0" smtClean="0"/>
+          </a:p>
+          <a:p>
+            <a:endParaRPr lang="en-GB" dirty="0"/>
+          </a:p>
+        </p:txBody>
+      </p:sp>
+    </p:spTree>
+    <p:extLst>
+      <p:ext uri="{BB962C8B-B14F-4D97-AF65-F5344CB8AC3E}">
+        <p14:creationId xmlns:p14="http://schemas.microsoft.com/office/powerpoint/2010/main" val="1633746460"/>
       </p:ext>
     </p:extLst>
   </p:cSld>
@@ -7642,7 +7983,7 @@
         </p:nvSpPr>
         <p:spPr>
           <a:xfrm>
-            <a:off x="1064180" y="5802191"/>
+            <a:off x="1064182" y="5802191"/>
             <a:ext cx="7154523" cy="861774"/>
           </a:xfrm>
           <a:prstGeom prst="rect">
@@ -7656,32 +7997,28 @@
           <a:lstStyle/>
           <a:p>
             <a:r>
-              <a:rPr lang="en-GB" sz="1000" dirty="0" smtClean="0"/>
+              <a:rPr lang="en-GB" sz="1000" dirty="0"/>
               <a:t>Sources of the images:</a:t>
             </a:r>
           </a:p>
           <a:p>
             <a:r>
-              <a:rPr lang="en-GB" sz="1000" dirty="0" smtClean="0"/>
-              <a:t>(1) https</a:t>
-            </a:r>
-            <a:r>
               <a:rPr lang="en-GB" sz="1000" dirty="0"/>
-              <a:t>://</a:t>
-            </a:r>
-            <a:r>
-              <a:rPr lang="en-GB" sz="1000" dirty="0" err="1" smtClean="0"/>
+              <a:t>(1) https://</a:t>
+            </a:r>
+            <a:r>
+              <a:rPr lang="en-GB" sz="1000" dirty="0" err="1"/>
               <a:t>i.ytimg.com</a:t>
             </a:r>
             <a:r>
-              <a:rPr lang="en-GB" sz="1000" dirty="0" smtClean="0"/>
+              <a:rPr lang="en-GB" sz="1000" dirty="0"/>
               <a:t>/vi/MjZIjHu0OfY/</a:t>
             </a:r>
             <a:r>
-              <a:rPr lang="en-GB" sz="1000" dirty="0" err="1" smtClean="0"/>
+              <a:rPr lang="en-GB" sz="1000" dirty="0" err="1"/>
               <a:t>hqdefault.jpg</a:t>
             </a:r>
-            <a:endParaRPr lang="en-GB" sz="1000" dirty="0" smtClean="0"/>
+            <a:endParaRPr lang="en-GB" sz="1000" dirty="0"/>
           </a:p>
           <a:p>
             <a:r>
@@ -7689,46 +8026,41 @@
               <a:t>(2) https://</a:t>
             </a:r>
             <a:r>
-              <a:rPr lang="en-GB" sz="1000" dirty="0" err="1" smtClean="0"/>
+              <a:rPr lang="en-GB" sz="1000" dirty="0" err="1"/>
               <a:t>cdn.bulbagarden.net</a:t>
             </a:r>
             <a:r>
-              <a:rPr lang="en-GB" sz="1000" dirty="0" smtClean="0"/>
+              <a:rPr lang="en-GB" sz="1000" dirty="0"/>
               <a:t>/upload/1/14/Pok%C3%A9mon_Center_inside_DPPt.png</a:t>
             </a:r>
           </a:p>
           <a:p>
             <a:r>
-              <a:rPr lang="en-GB" sz="1000" dirty="0" smtClean="0"/>
-              <a:t>(3</a:t>
-            </a:r>
-            <a:r>
               <a:rPr lang="en-GB" sz="1000" dirty="0"/>
-              <a:t>) http://</a:t>
-            </a:r>
-            <a:r>
-              <a:rPr lang="en-GB" sz="1000" dirty="0" err="1" smtClean="0"/>
+              <a:t>(3) http://</a:t>
+            </a:r>
+            <a:r>
+              <a:rPr lang="en-GB" sz="1000" dirty="0" err="1"/>
               <a:t>images.eurogamer.net</a:t>
             </a:r>
             <a:r>
-              <a:rPr lang="en-GB" sz="1000" dirty="0" smtClean="0"/>
+              <a:rPr lang="en-GB" sz="1000" dirty="0"/>
               <a:t>/2015/articles/1/8/6/2/7/2/5/</a:t>
             </a:r>
             <a:r>
-              <a:rPr lang="en-GB" sz="1000" dirty="0" err="1" smtClean="0"/>
+              <a:rPr lang="en-GB" sz="1000" dirty="0" err="1"/>
               <a:t>pokemon</a:t>
             </a:r>
             <a:r>
-              <a:rPr lang="en-GB" sz="1000" dirty="0" smtClean="0"/>
+              <a:rPr lang="en-GB" sz="1000" dirty="0"/>
               <a:t>-sun-and-moon-</a:t>
             </a:r>
           </a:p>
           <a:p>
             <a:r>
-              <a:rPr lang="en-GB" sz="1000" dirty="0" smtClean="0"/>
+              <a:rPr lang="en-GB" sz="1000" dirty="0"/>
               <a:t>demo-guide-how-to-unlock-ash-greninja-in-the-full-game-147672490344.jpg/EG11/resize/300x-1/quality/80/format/jpg</a:t>
             </a:r>
-            <a:endParaRPr lang="en-GB" sz="1000" dirty="0"/>
           </a:p>
         </p:txBody>
       </p:sp>
@@ -7753,7 +8085,7 @@
         </p:blipFill>
         <p:spPr>
           <a:xfrm>
-            <a:off x="9274002" y="614785"/>
+            <a:off x="9274003" y="614786"/>
             <a:ext cx="2671256" cy="1545804"/>
           </a:xfrm>
           <a:prstGeom prst="rect">
@@ -7783,7 +8115,7 @@
         </p:blipFill>
         <p:spPr>
           <a:xfrm>
-            <a:off x="9458119" y="2699657"/>
+            <a:off x="9458121" y="2699657"/>
             <a:ext cx="2389481" cy="1778000"/>
           </a:xfrm>
           <a:prstGeom prst="rect">
@@ -7813,8 +8145,8 @@
         </p:blipFill>
         <p:spPr>
           <a:xfrm>
-            <a:off x="9485712" y="5016725"/>
-            <a:ext cx="2459546" cy="1467529"/>
+            <a:off x="9485712" y="5016726"/>
+            <a:ext cx="2459547" cy="1467529"/>
           </a:xfrm>
           <a:prstGeom prst="rect">
             <a:avLst/>
@@ -8011,6 +8343,13 @@
   <p:clrMapOvr>
     <a:masterClrMapping/>
   </p:clrMapOvr>
+  <p:timing>
+    <p:tnLst>
+      <p:par>
+        <p:cTn id="1" dur="indefinite" restart="never" nodeType="tmRoot"/>
+      </p:par>
+    </p:tnLst>
+  </p:timing>
 </p:sld>
 </file>
 
@@ -8148,18 +8487,16 @@
           </a:p>
           <a:p>
             <a:r>
-              <a:rPr lang="es-ES" b="1" dirty="0" smtClean="0"/>
-              <a:t>[</a:t>
-            </a:r>
-            <a:r>
-              <a:rPr lang="es-ES" b="1" dirty="0" err="1" smtClean="0"/>
-              <a:t>TBContinued</a:t>
-            </a:r>
-            <a:r>
-              <a:rPr lang="es-ES" b="1" dirty="0" smtClean="0"/>
-              <a:t>]</a:t>
-            </a:r>
-            <a:endParaRPr lang="en-GB" b="1" dirty="0"/>
+              <a:rPr lang="en-GB" dirty="0" smtClean="0"/>
+              <a:t>Clock</a:t>
+            </a:r>
+          </a:p>
+          <a:p>
+            <a:r>
+              <a:rPr lang="en-GB" dirty="0" smtClean="0"/>
+              <a:t>Book Shelf</a:t>
+            </a:r>
+            <a:endParaRPr lang="en-GB" dirty="0"/>
           </a:p>
         </p:txBody>
       </p:sp>
@@ -8173,6 +8510,13 @@
   <p:clrMapOvr>
     <a:masterClrMapping/>
   </p:clrMapOvr>
+  <p:timing>
+    <p:tnLst>
+      <p:par>
+        <p:cTn id="1" dur="indefinite" restart="never" nodeType="tmRoot"/>
+      </p:par>
+    </p:tnLst>
+  </p:timing>
 </p:sld>
 </file>
 
@@ -8210,7 +8554,7 @@
           <a:p>
             <a:r>
               <a:rPr lang="en-GB" dirty="0" smtClean="0"/>
-              <a:t>Layout and Composition</a:t>
+              <a:t>Procedure to create significant objects</a:t>
             </a:r>
             <a:endParaRPr lang="en-GB" dirty="0"/>
           </a:p>
@@ -8226,21 +8570,107 @@
             <p:ph idx="1"/>
           </p:nvPr>
         </p:nvSpPr>
-        <p:spPr/>
-        <p:txBody>
-          <a:bodyPr/>
+        <p:spPr>
+          <a:xfrm>
+            <a:off x="677335" y="2160590"/>
+            <a:ext cx="8596668" cy="4254725"/>
+          </a:xfrm>
+        </p:spPr>
+        <p:txBody>
+          <a:bodyPr>
+            <a:normAutofit lnSpcReduction="10000"/>
+          </a:bodyPr>
           <a:lstStyle/>
           <a:p>
             <a:r>
               <a:rPr lang="en-GB" dirty="0" smtClean="0"/>
-              <a:t>Describe your general Layout</a:t>
-            </a:r>
-          </a:p>
-          <a:p>
+              <a:t>Showcase with TV base:</a:t>
+            </a:r>
+          </a:p>
+          <a:p>
+            <a:pPr lvl="1"/>
             <a:r>
               <a:rPr lang="en-GB" dirty="0" smtClean="0"/>
-              <a:t>For the most important objects, describe why their are placed in the scene in such way</a:t>
-            </a:r>
+              <a:t>Objective: Build a showcase to be arranged in the corner of the layout, having a radius of 1.5 units.</a:t>
+            </a:r>
+          </a:p>
+          <a:p>
+            <a:pPr marL="800080" lvl="1" indent="-342891">
+              <a:buFont typeface="+mj-lt"/>
+              <a:buAutoNum type="arabicPeriod"/>
+            </a:pPr>
+            <a:r>
+              <a:rPr lang="en-GB" dirty="0"/>
+              <a:t>W</a:t>
+            </a:r>
+            <a:r>
+              <a:rPr lang="en-GB" dirty="0" smtClean="0"/>
+              <a:t>e created a Cylinder with 3 units of diameter.</a:t>
+            </a:r>
+          </a:p>
+          <a:p>
+            <a:pPr marL="800080" lvl="1" indent="-342891">
+              <a:buFont typeface="+mj-lt"/>
+              <a:buAutoNum type="arabicPeriod"/>
+            </a:pPr>
+            <a:r>
+              <a:rPr lang="en-GB" dirty="0" smtClean="0"/>
+              <a:t>Using the knife tool, we added edges to the cylinder and separated it in two.</a:t>
+            </a:r>
+          </a:p>
+          <a:p>
+            <a:pPr marL="800080" lvl="1" indent="-342891">
+              <a:buFont typeface="+mj-lt"/>
+              <a:buAutoNum type="arabicPeriod"/>
+            </a:pPr>
+            <a:r>
+              <a:rPr lang="en-GB" dirty="0" smtClean="0"/>
+              <a:t>We repeated step 2. in order of obtaining one third of the original cylinder., and adjusted the size to have the desired height for the bottom base.</a:t>
+            </a:r>
+          </a:p>
+          <a:p>
+            <a:pPr marL="800080" lvl="1" indent="-342891">
+              <a:buFont typeface="+mj-lt"/>
+              <a:buAutoNum type="arabicPeriod"/>
+            </a:pPr>
+            <a:r>
+              <a:rPr lang="en-GB" dirty="0" smtClean="0"/>
+              <a:t>We selected the edges of the sharp corner of the object and added faces with Blender’s “F” command.</a:t>
+            </a:r>
+          </a:p>
+          <a:p>
+            <a:pPr marL="800080" lvl="1" indent="-342891">
+              <a:buFont typeface="+mj-lt"/>
+              <a:buAutoNum type="arabicPeriod"/>
+            </a:pPr>
+            <a:r>
+              <a:rPr lang="en-GB" dirty="0" smtClean="0"/>
+              <a:t>We selected the edges on the top shape of the base, added new vertices with “E”, scaled (“S”) them two units to get the middle part of the showcase. Then, we did the same adding the last segment of 1 unit of height.</a:t>
+            </a:r>
+          </a:p>
+          <a:p>
+            <a:pPr marL="800080" lvl="1" indent="-342891">
+              <a:buFont typeface="+mj-lt"/>
+              <a:buAutoNum type="arabicPeriod"/>
+            </a:pPr>
+            <a:r>
+              <a:rPr lang="en-GB" dirty="0" smtClean="0"/>
+              <a:t>We separated each segment and added materials and textures as needed. The middle part has a Glass BSDF material to make it invisible</a:t>
+            </a:r>
+            <a:endParaRPr lang="en-GB" dirty="0"/>
+          </a:p>
+          <a:p>
+            <a:pPr marL="800080" lvl="1" indent="-342891">
+              <a:buFont typeface="+mj-lt"/>
+              <a:buAutoNum type="arabicPeriod"/>
+            </a:pPr>
+            <a:endParaRPr lang="en-GB" dirty="0" smtClean="0"/>
+          </a:p>
+          <a:p>
+            <a:pPr marL="800080" lvl="1" indent="-342891">
+              <a:buFont typeface="+mj-lt"/>
+              <a:buAutoNum type="arabicPeriod"/>
+            </a:pPr>
             <a:endParaRPr lang="en-GB" dirty="0"/>
           </a:p>
         </p:txBody>
@@ -8248,13 +8678,20 @@
     </p:spTree>
     <p:extLst>
       <p:ext uri="{BB962C8B-B14F-4D97-AF65-F5344CB8AC3E}">
-        <p14:creationId xmlns:p14="http://schemas.microsoft.com/office/powerpoint/2010/main" val="3334049960"/>
+        <p14:creationId xmlns:p14="http://schemas.microsoft.com/office/powerpoint/2010/main" val="1813143453"/>
       </p:ext>
     </p:extLst>
   </p:cSld>
   <p:clrMapOvr>
     <a:masterClrMapping/>
   </p:clrMapOvr>
+  <p:timing>
+    <p:tnLst>
+      <p:par>
+        <p:cTn id="1" dur="indefinite" restart="never" nodeType="tmRoot"/>
+      </p:par>
+    </p:tnLst>
+  </p:timing>
 </p:sld>
 </file>
 
@@ -8277,12 +8714,12 @@
       </p:grpSpPr>
       <p:sp>
         <p:nvSpPr>
-          <p:cNvPr id="4" name="Title 3"/>
-          <p:cNvSpPr>
-            <a:spLocks noGrp="1"/>
-          </p:cNvSpPr>
-          <p:nvPr>
-            <p:ph type="ctrTitle"/>
+          <p:cNvPr id="2" name="Title 1"/>
+          <p:cNvSpPr>
+            <a:spLocks noGrp="1"/>
+          </p:cNvSpPr>
+          <p:nvPr>
+            <p:ph type="title"/>
           </p:nvPr>
         </p:nvSpPr>
         <p:spPr/>
@@ -8292,7 +8729,7 @@
           <a:p>
             <a:r>
               <a:rPr lang="en-GB" dirty="0" smtClean="0"/>
-              <a:t>Cameras</a:t>
+              <a:t>Imported Models </a:t>
             </a:r>
             <a:endParaRPr lang="en-GB" dirty="0"/>
           </a:p>
@@ -8300,12 +8737,12 @@
       </p:sp>
       <p:sp>
         <p:nvSpPr>
-          <p:cNvPr id="5" name="Subtitle 4"/>
-          <p:cNvSpPr>
-            <a:spLocks noGrp="1"/>
-          </p:cNvSpPr>
-          <p:nvPr>
-            <p:ph type="subTitle" idx="1"/>
+          <p:cNvPr id="3" name="Content Placeholder 2"/>
+          <p:cNvSpPr>
+            <a:spLocks noGrp="1"/>
+          </p:cNvSpPr>
+          <p:nvPr>
+            <p:ph idx="1"/>
           </p:nvPr>
         </p:nvSpPr>
         <p:spPr/>
@@ -8313,20 +8750,45 @@
           <a:bodyPr/>
           <a:lstStyle/>
           <a:p>
-            <a:endParaRPr lang="en-GB"/>
+            <a:r>
+              <a:rPr lang="en-GB" dirty="0" smtClean="0"/>
+              <a:t>Computer</a:t>
+            </a:r>
+          </a:p>
+          <a:p>
+            <a:r>
+              <a:rPr lang="en-GB" dirty="0" smtClean="0"/>
+              <a:t>Chairs</a:t>
+            </a:r>
+          </a:p>
+          <a:p>
+            <a:r>
+              <a:rPr lang="en-GB" dirty="0" smtClean="0"/>
+              <a:t>Books</a:t>
+            </a:r>
+          </a:p>
+          <a:p>
+            <a:endParaRPr lang="en-GB" dirty="0"/>
           </a:p>
         </p:txBody>
       </p:sp>
     </p:spTree>
     <p:extLst>
       <p:ext uri="{BB962C8B-B14F-4D97-AF65-F5344CB8AC3E}">
-        <p14:creationId xmlns:p14="http://schemas.microsoft.com/office/powerpoint/2010/main" val="1865273154"/>
+        <p14:creationId xmlns:p14="http://schemas.microsoft.com/office/powerpoint/2010/main" val="1867671600"/>
       </p:ext>
     </p:extLst>
   </p:cSld>
   <p:clrMapOvr>
     <a:masterClrMapping/>
   </p:clrMapOvr>
+  <p:timing>
+    <p:tnLst>
+      <p:par>
+        <p:cTn id="1" dur="indefinite" restart="never" nodeType="tmRoot"/>
+      </p:par>
+    </p:tnLst>
+  </p:timing>
 </p:sld>
 </file>
 
@@ -8364,7 +8826,7 @@
           <a:p>
             <a:r>
               <a:rPr lang="en-GB" dirty="0" smtClean="0"/>
-              <a:t>Illumination</a:t>
+              <a:t>Origin of Imported Models</a:t>
             </a:r>
             <a:endParaRPr lang="en-GB" dirty="0"/>
           </a:p>
@@ -8385,16 +8847,6 @@
           <a:bodyPr/>
           <a:lstStyle/>
           <a:p>
-            <a:r>
-              <a:rPr lang="en-GB" dirty="0" smtClean="0"/>
-              <a:t>Describe the illumination scheme</a:t>
-            </a:r>
-          </a:p>
-          <a:p>
-            <a:r>
-              <a:rPr lang="en-GB" dirty="0" smtClean="0"/>
-              <a:t>Describe why you chose such illumination scheme</a:t>
-            </a:r>
             <a:endParaRPr lang="en-GB" dirty="0"/>
           </a:p>
         </p:txBody>
@@ -8402,13 +8854,20 @@
     </p:spTree>
     <p:extLst>
       <p:ext uri="{BB962C8B-B14F-4D97-AF65-F5344CB8AC3E}">
-        <p14:creationId xmlns:p14="http://schemas.microsoft.com/office/powerpoint/2010/main" val="181089961"/>
+        <p14:creationId xmlns:p14="http://schemas.microsoft.com/office/powerpoint/2010/main" val="1861154853"/>
       </p:ext>
     </p:extLst>
   </p:cSld>
   <p:clrMapOvr>
     <a:masterClrMapping/>
   </p:clrMapOvr>
+  <p:timing>
+    <p:tnLst>
+      <p:par>
+        <p:cTn id="1" dur="indefinite" restart="never" nodeType="tmRoot"/>
+      </p:par>
+    </p:tnLst>
+  </p:timing>
 </p:sld>
 </file>
 

</xml_diff>